<commit_message>
some work on presentation
</commit_message>
<xml_diff>
--- a/Präsentation/seminar.pptx
+++ b/Präsentation/seminar.pptx
@@ -5,17 +5,15 @@
     <p:sldMasterId id="2147483663" r:id="rId1"/>
   </p:sldMasterIdLst>
   <p:notesMasterIdLst>
-    <p:notesMasterId r:id="rId7"/>
+    <p:notesMasterId r:id="rId5"/>
   </p:notesMasterIdLst>
   <p:handoutMasterIdLst>
-    <p:handoutMasterId r:id="rId8"/>
+    <p:handoutMasterId r:id="rId6"/>
   </p:handoutMasterIdLst>
   <p:sldIdLst>
     <p:sldId id="752" r:id="rId2"/>
-    <p:sldId id="923" r:id="rId3"/>
-    <p:sldId id="949" r:id="rId4"/>
-    <p:sldId id="950" r:id="rId5"/>
-    <p:sldId id="948" r:id="rId6"/>
+    <p:sldId id="949" r:id="rId3"/>
+    <p:sldId id="951" r:id="rId4"/>
   </p:sldIdLst>
   <p:sldSz cx="9144000" cy="6858000" type="screen4x3"/>
   <p:notesSz cx="6858000" cy="9144000"/>
@@ -793,63 +791,24 @@
         </p:nvSpPr>
         <p:spPr/>
         <p:txBody>
-          <a:bodyPr>
-            <a:normAutofit/>
-          </a:bodyPr>
-          <a:lstStyle/>
-          <a:p>
-            <a:br>
-              <a:rPr lang="en-US" dirty="0"/>
-            </a:br>
-            <a:r>
-              <a:rPr lang="en-US" dirty="0"/>
-              <a:t>We focus on evaluating three dependability aspects: </a:t>
-            </a:r>
-            <a:r>
-              <a:rPr lang="en-US" dirty="0" err="1"/>
-              <a:t>i</a:t>
-            </a:r>
-            <a:r>
-              <a:rPr lang="en-US" dirty="0"/>
-              <a:t>) the ability of the system to provision resources in an elastic manner, i.e., system elasticity, ii) the ability of the system to isolate different applications and customers sharing the physical infrastructure in terms of the performance they observe, i.e., performance isolation, and iii) the ability of the system to deal with attacks exploiting novel attack surfaces such as hypervisors, i.e., intrusion detection and prevention. We discuss the challenges in measuring and quantifying the mentioned three dependability properties, presenting existing approaches to tackle them. Finally, we discuss open issues and emerging directions for future work in the area of dependability benchmarking. </a:t>
-            </a:r>
-          </a:p>
-          <a:p>
-            <a:pPr>
-              <a:spcBef>
-                <a:spcPts val="1200"/>
-              </a:spcBef>
-            </a:pPr>
-            <a:r>
-              <a:rPr lang="en-US" sz="1400" dirty="0"/>
-              <a:t>Most failures occur in high load periods</a:t>
-            </a:r>
-          </a:p>
-          <a:p>
-            <a:pPr>
-              <a:spcBef>
-                <a:spcPts val="1200"/>
-              </a:spcBef>
-            </a:pPr>
-            <a:r>
-              <a:rPr lang="en-US" sz="1200" dirty="0"/>
-              <a:t>Service overload, hardware failures and software errors are among the most common causes of service unavailability</a:t>
-            </a:r>
-            <a:endParaRPr lang="en-US" sz="1400" dirty="0"/>
-          </a:p>
-          <a:p>
-            <a:endParaRPr lang="en-US" dirty="0"/>
-          </a:p>
-        </p:txBody>
-      </p:sp>
-      <p:sp>
-        <p:nvSpPr>
-          <p:cNvPr id="4" name="Fußzeilenplatzhalter 3"/>
-          <p:cNvSpPr>
-            <a:spLocks noGrp="1"/>
-          </p:cNvSpPr>
-          <p:nvPr>
-            <p:ph type="ftr" sz="quarter" idx="10"/>
+          <a:bodyPr/>
+          <a:lstStyle/>
+          <a:p>
+            <a:r>
+              <a:rPr lang="de-DE" dirty="0"/>
+              <a:t>Konfigurationsmanagement im US-Militär entstanden</a:t>
+            </a:r>
+          </a:p>
+        </p:txBody>
+      </p:sp>
+      <p:sp>
+        <p:nvSpPr>
+          <p:cNvPr id="4" name="Foliennummernplatzhalter 3"/>
+          <p:cNvSpPr>
+            <a:spLocks noGrp="1"/>
+          </p:cNvSpPr>
+          <p:nvPr>
+            <p:ph type="sldNum" sz="quarter" idx="10"/>
           </p:nvPr>
         </p:nvSpPr>
         <p:spPr/>
@@ -857,468 +816,18 @@
           <a:bodyPr/>
           <a:lstStyle/>
           <a:p>
-            <a:pPr>
-              <a:defRPr/>
-            </a:pPr>
-            <a:r>
-              <a:rPr lang="de-DE"/>
-              <a:t>Prof. Dr. Max Mustermann | </a:t>
-            </a:r>
-            <a:br>
-              <a:rPr lang="de-DE"/>
-            </a:br>
-            <a:r>
-              <a:rPr lang="de-DE"/>
-              <a:t>Name of Faculty</a:t>
-            </a:r>
-          </a:p>
-        </p:txBody>
-      </p:sp>
-      <p:sp>
-        <p:nvSpPr>
-          <p:cNvPr id="5" name="Foliennummernplatzhalter 4"/>
-          <p:cNvSpPr>
-            <a:spLocks noGrp="1"/>
-          </p:cNvSpPr>
-          <p:nvPr>
-            <p:ph type="sldNum" sz="quarter" idx="11"/>
-          </p:nvPr>
-        </p:nvSpPr>
-        <p:spPr/>
-        <p:txBody>
-          <a:bodyPr/>
-          <a:lstStyle/>
-          <a:p>
-            <a:pPr>
-              <a:defRPr/>
-            </a:pPr>
-            <a:fld id="{32BDCDAC-DE62-4AD3-97B8-72AB65504827}" type="slidenum">
-              <a:rPr lang="de-DE" smtClean="0"/>
-              <a:pPr>
-                <a:defRPr/>
-              </a:pPr>
-              <a:t>2</a:t>
+            <a:fld id="{781A4F79-E684-4978-8182-2DD3F95DEE42}" type="slidenum">
+              <a:rPr lang="en-US" smtClean="0"/>
+              <a:t>3</a:t>
             </a:fld>
-            <a:endParaRPr lang="de-DE"/>
+            <a:endParaRPr lang="en-US"/>
           </a:p>
         </p:txBody>
       </p:sp>
     </p:spTree>
     <p:extLst>
       <p:ext uri="{BB962C8B-B14F-4D97-AF65-F5344CB8AC3E}">
-        <p14:creationId xmlns:p14="http://schemas.microsoft.com/office/powerpoint/2010/main" val="393236893"/>
-      </p:ext>
-    </p:extLst>
-  </p:cSld>
-  <p:clrMapOvr>
-    <a:masterClrMapping/>
-  </p:clrMapOvr>
-</p:notes>
-</file>
-
-<file path=ppt/notesSlides/notesSlide3.xml><?xml version="1.0" encoding="utf-8"?>
-<p:notes xmlns:a="http://schemas.openxmlformats.org/drawingml/2006/main" xmlns:r="http://schemas.openxmlformats.org/officeDocument/2006/relationships" xmlns:p="http://schemas.openxmlformats.org/presentationml/2006/main">
-  <p:cSld>
-    <p:spTree>
-      <p:nvGrpSpPr>
-        <p:cNvPr id="1" name=""/>
-        <p:cNvGrpSpPr/>
-        <p:nvPr/>
-      </p:nvGrpSpPr>
-      <p:grpSpPr>
-        <a:xfrm>
-          <a:off x="0" y="0"/>
-          <a:ext cx="0" cy="0"/>
-          <a:chOff x="0" y="0"/>
-          <a:chExt cx="0" cy="0"/>
-        </a:xfrm>
-      </p:grpSpPr>
-      <p:sp>
-        <p:nvSpPr>
-          <p:cNvPr id="2" name="Folienbildplatzhalter 1"/>
-          <p:cNvSpPr>
-            <a:spLocks noGrp="1" noRot="1" noChangeAspect="1"/>
-          </p:cNvSpPr>
-          <p:nvPr>
-            <p:ph type="sldImg"/>
-          </p:nvPr>
-        </p:nvSpPr>
-        <p:spPr/>
-      </p:sp>
-      <p:sp>
-        <p:nvSpPr>
-          <p:cNvPr id="3" name="Notizenplatzhalter 2"/>
-          <p:cNvSpPr>
-            <a:spLocks noGrp="1"/>
-          </p:cNvSpPr>
-          <p:nvPr>
-            <p:ph type="body" idx="1"/>
-          </p:nvPr>
-        </p:nvSpPr>
-        <p:spPr/>
-        <p:txBody>
-          <a:bodyPr>
-            <a:normAutofit/>
-          </a:bodyPr>
-          <a:lstStyle/>
-          <a:p>
-            <a:br>
-              <a:rPr lang="en-US" dirty="0"/>
-            </a:br>
-            <a:r>
-              <a:rPr lang="en-US" dirty="0"/>
-              <a:t>We focus on evaluating three dependability aspects: </a:t>
-            </a:r>
-            <a:r>
-              <a:rPr lang="en-US" dirty="0" err="1"/>
-              <a:t>i</a:t>
-            </a:r>
-            <a:r>
-              <a:rPr lang="en-US" dirty="0"/>
-              <a:t>) the ability of the system to provision resources in an elastic manner, i.e., system elasticity, ii) the ability of the system to isolate different applications and customers sharing the physical infrastructure in terms of the performance they observe, i.e., performance isolation, and iii) the ability of the system to deal with attacks exploiting novel attack surfaces such as hypervisors, i.e., intrusion detection and prevention. We discuss the challenges in measuring and quantifying the mentioned three dependability properties, presenting existing approaches to tackle them. Finally, we discuss open issues and emerging directions for future work in the area of dependability benchmarking. </a:t>
-            </a:r>
-          </a:p>
-          <a:p>
-            <a:pPr>
-              <a:spcBef>
-                <a:spcPts val="1200"/>
-              </a:spcBef>
-            </a:pPr>
-            <a:r>
-              <a:rPr lang="en-US" sz="1400" dirty="0"/>
-              <a:t>Most failures occur in high load periods</a:t>
-            </a:r>
-          </a:p>
-          <a:p>
-            <a:pPr>
-              <a:spcBef>
-                <a:spcPts val="1200"/>
-              </a:spcBef>
-            </a:pPr>
-            <a:r>
-              <a:rPr lang="en-US" sz="1200" dirty="0"/>
-              <a:t>Service overload, hardware failures and software errors are among the most common causes of service unavailability</a:t>
-            </a:r>
-            <a:endParaRPr lang="en-US" sz="1400" dirty="0"/>
-          </a:p>
-          <a:p>
-            <a:endParaRPr lang="en-US" dirty="0"/>
-          </a:p>
-        </p:txBody>
-      </p:sp>
-      <p:sp>
-        <p:nvSpPr>
-          <p:cNvPr id="4" name="Fußzeilenplatzhalter 3"/>
-          <p:cNvSpPr>
-            <a:spLocks noGrp="1"/>
-          </p:cNvSpPr>
-          <p:nvPr>
-            <p:ph type="ftr" sz="quarter" idx="10"/>
-          </p:nvPr>
-        </p:nvSpPr>
-        <p:spPr/>
-        <p:txBody>
-          <a:bodyPr/>
-          <a:lstStyle/>
-          <a:p>
-            <a:pPr>
-              <a:defRPr/>
-            </a:pPr>
-            <a:r>
-              <a:rPr lang="de-DE"/>
-              <a:t>Prof. Dr. Max Mustermann | </a:t>
-            </a:r>
-            <a:br>
-              <a:rPr lang="de-DE"/>
-            </a:br>
-            <a:r>
-              <a:rPr lang="de-DE"/>
-              <a:t>Name of Faculty</a:t>
-            </a:r>
-          </a:p>
-        </p:txBody>
-      </p:sp>
-      <p:sp>
-        <p:nvSpPr>
-          <p:cNvPr id="5" name="Foliennummernplatzhalter 4"/>
-          <p:cNvSpPr>
-            <a:spLocks noGrp="1"/>
-          </p:cNvSpPr>
-          <p:nvPr>
-            <p:ph type="sldNum" sz="quarter" idx="11"/>
-          </p:nvPr>
-        </p:nvSpPr>
-        <p:spPr/>
-        <p:txBody>
-          <a:bodyPr/>
-          <a:lstStyle/>
-          <a:p>
-            <a:pPr>
-              <a:defRPr/>
-            </a:pPr>
-            <a:fld id="{32BDCDAC-DE62-4AD3-97B8-72AB65504827}" type="slidenum">
-              <a:rPr lang="de-DE" smtClean="0"/>
-              <a:pPr>
-                <a:defRPr/>
-              </a:pPr>
-              <a:t>3</a:t>
-            </a:fld>
-            <a:endParaRPr lang="de-DE"/>
-          </a:p>
-        </p:txBody>
-      </p:sp>
-    </p:spTree>
-    <p:extLst>
-      <p:ext uri="{BB962C8B-B14F-4D97-AF65-F5344CB8AC3E}">
-        <p14:creationId xmlns:p14="http://schemas.microsoft.com/office/powerpoint/2010/main" val="1803744201"/>
-      </p:ext>
-    </p:extLst>
-  </p:cSld>
-  <p:clrMapOvr>
-    <a:masterClrMapping/>
-  </p:clrMapOvr>
-</p:notes>
-</file>
-
-<file path=ppt/notesSlides/notesSlide4.xml><?xml version="1.0" encoding="utf-8"?>
-<p:notes xmlns:a="http://schemas.openxmlformats.org/drawingml/2006/main" xmlns:r="http://schemas.openxmlformats.org/officeDocument/2006/relationships" xmlns:p="http://schemas.openxmlformats.org/presentationml/2006/main">
-  <p:cSld>
-    <p:spTree>
-      <p:nvGrpSpPr>
-        <p:cNvPr id="1" name=""/>
-        <p:cNvGrpSpPr/>
-        <p:nvPr/>
-      </p:nvGrpSpPr>
-      <p:grpSpPr>
-        <a:xfrm>
-          <a:off x="0" y="0"/>
-          <a:ext cx="0" cy="0"/>
-          <a:chOff x="0" y="0"/>
-          <a:chExt cx="0" cy="0"/>
-        </a:xfrm>
-      </p:grpSpPr>
-      <p:sp>
-        <p:nvSpPr>
-          <p:cNvPr id="2" name="Folienbildplatzhalter 1"/>
-          <p:cNvSpPr>
-            <a:spLocks noGrp="1" noRot="1" noChangeAspect="1"/>
-          </p:cNvSpPr>
-          <p:nvPr>
-            <p:ph type="sldImg"/>
-          </p:nvPr>
-        </p:nvSpPr>
-        <p:spPr/>
-      </p:sp>
-      <p:sp>
-        <p:nvSpPr>
-          <p:cNvPr id="3" name="Notizenplatzhalter 2"/>
-          <p:cNvSpPr>
-            <a:spLocks noGrp="1"/>
-          </p:cNvSpPr>
-          <p:nvPr>
-            <p:ph type="body" idx="1"/>
-          </p:nvPr>
-        </p:nvSpPr>
-        <p:spPr/>
-        <p:txBody>
-          <a:bodyPr>
-            <a:normAutofit/>
-          </a:bodyPr>
-          <a:lstStyle/>
-          <a:p>
-            <a:br>
-              <a:rPr lang="en-US" dirty="0"/>
-            </a:br>
-            <a:r>
-              <a:rPr lang="en-US" dirty="0"/>
-              <a:t>We focus on evaluating three dependability aspects: </a:t>
-            </a:r>
-            <a:r>
-              <a:rPr lang="en-US" dirty="0" err="1"/>
-              <a:t>i</a:t>
-            </a:r>
-            <a:r>
-              <a:rPr lang="en-US" dirty="0"/>
-              <a:t>) the ability of the system to provision resources in an elastic manner, i.e., system elasticity, ii) the ability of the system to isolate different applications and customers sharing the physical infrastructure in terms of the performance they observe, i.e., performance isolation, and iii) the ability of the system to deal with attacks exploiting novel attack surfaces such as hypervisors, i.e., intrusion detection and prevention. We discuss the challenges in measuring and quantifying the mentioned three dependability properties, presenting existing approaches to tackle them. Finally, we discuss open issues and emerging directions for future work in the area of dependability benchmarking. </a:t>
-            </a:r>
-          </a:p>
-          <a:p>
-            <a:pPr>
-              <a:spcBef>
-                <a:spcPts val="1200"/>
-              </a:spcBef>
-            </a:pPr>
-            <a:r>
-              <a:rPr lang="en-US" sz="1400" dirty="0"/>
-              <a:t>Most failures occur in high load periods</a:t>
-            </a:r>
-          </a:p>
-          <a:p>
-            <a:pPr>
-              <a:spcBef>
-                <a:spcPts val="1200"/>
-              </a:spcBef>
-            </a:pPr>
-            <a:r>
-              <a:rPr lang="en-US" sz="1200" dirty="0"/>
-              <a:t>Service overload, hardware failures and software errors are among the most common causes of service unavailability</a:t>
-            </a:r>
-            <a:endParaRPr lang="en-US" sz="1400" dirty="0"/>
-          </a:p>
-          <a:p>
-            <a:endParaRPr lang="en-US" dirty="0"/>
-          </a:p>
-        </p:txBody>
-      </p:sp>
-      <p:sp>
-        <p:nvSpPr>
-          <p:cNvPr id="4" name="Fußzeilenplatzhalter 3"/>
-          <p:cNvSpPr>
-            <a:spLocks noGrp="1"/>
-          </p:cNvSpPr>
-          <p:nvPr>
-            <p:ph type="ftr" sz="quarter" idx="10"/>
-          </p:nvPr>
-        </p:nvSpPr>
-        <p:spPr/>
-        <p:txBody>
-          <a:bodyPr/>
-          <a:lstStyle/>
-          <a:p>
-            <a:pPr>
-              <a:defRPr/>
-            </a:pPr>
-            <a:r>
-              <a:rPr lang="de-DE"/>
-              <a:t>Prof. Dr. Max Mustermann | </a:t>
-            </a:r>
-            <a:br>
-              <a:rPr lang="de-DE"/>
-            </a:br>
-            <a:r>
-              <a:rPr lang="de-DE"/>
-              <a:t>Name of Faculty</a:t>
-            </a:r>
-          </a:p>
-        </p:txBody>
-      </p:sp>
-      <p:sp>
-        <p:nvSpPr>
-          <p:cNvPr id="5" name="Foliennummernplatzhalter 4"/>
-          <p:cNvSpPr>
-            <a:spLocks noGrp="1"/>
-          </p:cNvSpPr>
-          <p:nvPr>
-            <p:ph type="sldNum" sz="quarter" idx="11"/>
-          </p:nvPr>
-        </p:nvSpPr>
-        <p:spPr/>
-        <p:txBody>
-          <a:bodyPr/>
-          <a:lstStyle/>
-          <a:p>
-            <a:pPr>
-              <a:defRPr/>
-            </a:pPr>
-            <a:fld id="{32BDCDAC-DE62-4AD3-97B8-72AB65504827}" type="slidenum">
-              <a:rPr lang="de-DE" smtClean="0"/>
-              <a:pPr>
-                <a:defRPr/>
-              </a:pPr>
-              <a:t>4</a:t>
-            </a:fld>
-            <a:endParaRPr lang="de-DE"/>
-          </a:p>
-        </p:txBody>
-      </p:sp>
-    </p:spTree>
-    <p:extLst>
-      <p:ext uri="{BB962C8B-B14F-4D97-AF65-F5344CB8AC3E}">
-        <p14:creationId xmlns:p14="http://schemas.microsoft.com/office/powerpoint/2010/main" val="3555084253"/>
-      </p:ext>
-    </p:extLst>
-  </p:cSld>
-  <p:clrMapOvr>
-    <a:masterClrMapping/>
-  </p:clrMapOvr>
-</p:notes>
-</file>
-
-<file path=ppt/notesSlides/notesSlide5.xml><?xml version="1.0" encoding="utf-8"?>
-<p:notes xmlns:a="http://schemas.openxmlformats.org/drawingml/2006/main" xmlns:r="http://schemas.openxmlformats.org/officeDocument/2006/relationships" xmlns:p="http://schemas.openxmlformats.org/presentationml/2006/main">
-  <p:cSld>
-    <p:spTree>
-      <p:nvGrpSpPr>
-        <p:cNvPr id="1" name=""/>
-        <p:cNvGrpSpPr/>
-        <p:nvPr/>
-      </p:nvGrpSpPr>
-      <p:grpSpPr>
-        <a:xfrm>
-          <a:off x="0" y="0"/>
-          <a:ext cx="0" cy="0"/>
-          <a:chOff x="0" y="0"/>
-          <a:chExt cx="0" cy="0"/>
-        </a:xfrm>
-      </p:grpSpPr>
-      <p:sp>
-        <p:nvSpPr>
-          <p:cNvPr id="2" name="Folienbildplatzhalter 1"/>
-          <p:cNvSpPr>
-            <a:spLocks noGrp="1" noRot="1" noChangeAspect="1"/>
-          </p:cNvSpPr>
-          <p:nvPr>
-            <p:ph type="sldImg"/>
-          </p:nvPr>
-        </p:nvSpPr>
-        <p:spPr/>
-      </p:sp>
-      <p:sp>
-        <p:nvSpPr>
-          <p:cNvPr id="3" name="Notizenplatzhalter 2"/>
-          <p:cNvSpPr>
-            <a:spLocks noGrp="1"/>
-          </p:cNvSpPr>
-          <p:nvPr>
-            <p:ph type="body" idx="1"/>
-          </p:nvPr>
-        </p:nvSpPr>
-        <p:spPr/>
-        <p:txBody>
-          <a:bodyPr/>
-          <a:lstStyle/>
-          <a:p>
-            <a:endParaRPr lang="en-US"/>
-          </a:p>
-        </p:txBody>
-      </p:sp>
-      <p:sp>
-        <p:nvSpPr>
-          <p:cNvPr id="4" name="Foliennummernplatzhalter 3"/>
-          <p:cNvSpPr>
-            <a:spLocks noGrp="1"/>
-          </p:cNvSpPr>
-          <p:nvPr>
-            <p:ph type="sldNum" sz="quarter" idx="10"/>
-          </p:nvPr>
-        </p:nvSpPr>
-        <p:spPr/>
-        <p:txBody>
-          <a:bodyPr/>
-          <a:lstStyle/>
-          <a:p>
-            <a:fld id="{781A4F79-E684-4978-8182-2DD3F95DEE42}" type="slidenum">
-              <a:rPr lang="en-US" smtClean="0"/>
-              <a:t>5</a:t>
-            </a:fld>
-            <a:endParaRPr lang="en-US"/>
-          </a:p>
-        </p:txBody>
-      </p:sp>
-    </p:spTree>
-    <p:extLst>
-      <p:ext uri="{BB962C8B-B14F-4D97-AF65-F5344CB8AC3E}">
-        <p14:creationId xmlns:p14="http://schemas.microsoft.com/office/powerpoint/2010/main" val="3192979180"/>
+        <p14:creationId xmlns:p14="http://schemas.microsoft.com/office/powerpoint/2010/main" val="837069237"/>
       </p:ext>
     </p:extLst>
   </p:cSld>
@@ -3382,14 +2891,70 @@
             <p:ph type="title"/>
           </p:nvPr>
         </p:nvSpPr>
+        <p:spPr>
+          <a:xfrm>
+            <a:off x="628650" y="990600"/>
+            <a:ext cx="7886700" cy="700089"/>
+          </a:xfrm>
+        </p:spPr>
+        <p:txBody>
+          <a:bodyPr/>
+          <a:lstStyle/>
+          <a:p>
+            <a:r>
+              <a:rPr lang="de-DE" dirty="0"/>
+              <a:t>Titelmasterformat durch Klicken bearbeiten</a:t>
+            </a:r>
+          </a:p>
+        </p:txBody>
+      </p:sp>
+      <p:sp>
+        <p:nvSpPr>
+          <p:cNvPr id="3" name="Inhaltsplatzhalter 2"/>
+          <p:cNvSpPr>
+            <a:spLocks noGrp="1"/>
+          </p:cNvSpPr>
+          <p:nvPr>
+            <p:ph idx="1"/>
+          </p:nvPr>
+        </p:nvSpPr>
         <p:spPr/>
         <p:txBody>
           <a:bodyPr/>
           <a:lstStyle/>
           <a:p>
-            <a:r>
-              <a:rPr lang="de-DE"/>
-              <a:t>Titelmasterformat durch Klicken bearbeiten</a:t>
+            <a:pPr lvl="0"/>
+            <a:r>
+              <a:rPr lang="de-DE"/>
+              <a:t>Formatvorlagen des Textmasters bearbeiten</a:t>
+            </a:r>
+          </a:p>
+          <a:p>
+            <a:pPr lvl="1"/>
+            <a:r>
+              <a:rPr lang="de-DE"/>
+              <a:t>Zweite Ebene</a:t>
+            </a:r>
+          </a:p>
+          <a:p>
+            <a:pPr lvl="2"/>
+            <a:r>
+              <a:rPr lang="de-DE"/>
+              <a:t>Dritte Ebene</a:t>
+            </a:r>
+          </a:p>
+          <a:p>
+            <a:pPr lvl="3"/>
+            <a:r>
+              <a:rPr lang="de-DE"/>
+              <a:t>Vierte Ebene</a:t>
+            </a:r>
+          </a:p>
+          <a:p>
+            <a:pPr lvl="4"/>
+            <a:r>
+              <a:rPr lang="de-DE"/>
+              <a:t>Fünfte Ebene</a:t>
             </a:r>
             <a:endParaRPr lang="de-DE"/>
           </a:p>
@@ -3397,58 +2962,6 @@
       </p:sp>
       <p:sp>
         <p:nvSpPr>
-          <p:cNvPr id="3" name="Inhaltsplatzhalter 2"/>
-          <p:cNvSpPr>
-            <a:spLocks noGrp="1"/>
-          </p:cNvSpPr>
-          <p:nvPr>
-            <p:ph idx="1"/>
-          </p:nvPr>
-        </p:nvSpPr>
-        <p:spPr/>
-        <p:txBody>
-          <a:bodyPr/>
-          <a:lstStyle/>
-          <a:p>
-            <a:pPr lvl="0"/>
-            <a:r>
-              <a:rPr lang="de-DE"/>
-              <a:t>Formatvorlagen des Textmasters bearbeiten</a:t>
-            </a:r>
-          </a:p>
-          <a:p>
-            <a:pPr lvl="1"/>
-            <a:r>
-              <a:rPr lang="de-DE"/>
-              <a:t>Zweite Ebene</a:t>
-            </a:r>
-          </a:p>
-          <a:p>
-            <a:pPr lvl="2"/>
-            <a:r>
-              <a:rPr lang="de-DE"/>
-              <a:t>Dritte Ebene</a:t>
-            </a:r>
-          </a:p>
-          <a:p>
-            <a:pPr lvl="3"/>
-            <a:r>
-              <a:rPr lang="de-DE"/>
-              <a:t>Vierte Ebene</a:t>
-            </a:r>
-          </a:p>
-          <a:p>
-            <a:pPr lvl="4"/>
-            <a:r>
-              <a:rPr lang="de-DE"/>
-              <a:t>Fünfte Ebene</a:t>
-            </a:r>
-            <a:endParaRPr lang="de-DE"/>
-          </a:p>
-        </p:txBody>
-      </p:sp>
-      <p:sp>
-        <p:nvSpPr>
           <p:cNvPr id="4" name="Datumsplatzhalter 3"/>
           <p:cNvSpPr>
             <a:spLocks noGrp="1"/>
@@ -3457,13 +2970,23 @@
             <p:ph type="dt" sz="half" idx="10"/>
           </p:nvPr>
         </p:nvSpPr>
-        <p:spPr/>
-        <p:txBody>
-          <a:bodyPr/>
-          <a:lstStyle/>
+        <p:spPr>
+          <a:xfrm>
+            <a:off x="504825" y="6553199"/>
+            <a:ext cx="2057400" cy="457200"/>
+          </a:xfrm>
+        </p:spPr>
+        <p:txBody>
+          <a:bodyPr/>
+          <a:lstStyle>
+            <a:lvl1pPr>
+              <a:defRPr sz="1400"/>
+            </a:lvl1pPr>
+          </a:lstStyle>
           <a:p>
             <a:fld id="{17EB3B84-8DE7-4637-8B07-77439BD9AF98}" type="datetime1">
               <a:rPr lang="en-US" smtClean="0"/>
+              <a:pPr/>
               <a:t>12/28/2016</a:t>
             </a:fld>
             <a:endParaRPr lang="en-US" dirty="0"/>
@@ -3480,16 +3003,24 @@
             <p:ph type="ftr" sz="quarter" idx="11"/>
           </p:nvPr>
         </p:nvSpPr>
-        <p:spPr/>
-        <p:txBody>
-          <a:bodyPr/>
-          <a:lstStyle/>
-          <a:p>
-            <a:r>
-              <a:rPr lang="en-US"/>
+        <p:spPr>
+          <a:xfrm>
+            <a:off x="3048000" y="6553200"/>
+            <a:ext cx="3086100" cy="457200"/>
+          </a:xfrm>
+        </p:spPr>
+        <p:txBody>
+          <a:bodyPr/>
+          <a:lstStyle>
+            <a:lvl1pPr>
+              <a:defRPr sz="1400"/>
+            </a:lvl1pPr>
+          </a:lstStyle>
+          <a:p>
+            <a:r>
+              <a:rPr lang="en-US" dirty="0"/>
               <a:t>Slide Template</a:t>
             </a:r>
-            <a:endParaRPr lang="en-US" dirty="0"/>
           </a:p>
         </p:txBody>
       </p:sp>
@@ -3503,10 +3034,19 @@
             <p:ph type="sldNum" sz="quarter" idx="12"/>
           </p:nvPr>
         </p:nvSpPr>
-        <p:spPr/>
-        <p:txBody>
-          <a:bodyPr/>
-          <a:lstStyle/>
+        <p:spPr>
+          <a:xfrm>
+            <a:off x="6477000" y="6553200"/>
+            <a:ext cx="2057400" cy="457200"/>
+          </a:xfrm>
+        </p:spPr>
+        <p:txBody>
+          <a:bodyPr/>
+          <a:lstStyle>
+            <a:lvl1pPr>
+              <a:defRPr sz="1400"/>
+            </a:lvl1pPr>
+          </a:lstStyle>
           <a:p>
             <a:fld id="{5C476CE9-DBD6-47B2-9488-80AA33A3CE56}" type="slidenum">
               <a:rPr lang="en-US" smtClean="0"/>
@@ -5193,232 +4733,13 @@
       </p:grpSpPr>
       <p:sp>
         <p:nvSpPr>
-          <p:cNvPr id="2" name="Titelplatzhalter 1"/>
-          <p:cNvSpPr>
-            <a:spLocks noGrp="1"/>
-          </p:cNvSpPr>
-          <p:nvPr>
-            <p:ph type="title"/>
-          </p:nvPr>
-        </p:nvSpPr>
-        <p:spPr>
-          <a:xfrm>
-            <a:off x="628650" y="365126"/>
-            <a:ext cx="7886700" cy="1325563"/>
-          </a:xfrm>
-          <a:prstGeom prst="rect">
-            <a:avLst/>
-          </a:prstGeom>
-        </p:spPr>
-        <p:txBody>
-          <a:bodyPr vert="horz" lIns="91440" tIns="45720" rIns="91440" bIns="45720" rtlCol="0" anchor="ctr">
-            <a:normAutofit/>
-          </a:bodyPr>
-          <a:lstStyle/>
-          <a:p>
-            <a:r>
-              <a:rPr lang="de-DE"/>
-              <a:t>Titelmasterformat durch Klicken bearbeiten</a:t>
-            </a:r>
-            <a:endParaRPr lang="de-DE"/>
-          </a:p>
-        </p:txBody>
-      </p:sp>
-      <p:sp>
-        <p:nvSpPr>
-          <p:cNvPr id="3" name="Textplatzhalter 2"/>
-          <p:cNvSpPr>
-            <a:spLocks noGrp="1"/>
-          </p:cNvSpPr>
-          <p:nvPr>
-            <p:ph type="body" idx="1"/>
-          </p:nvPr>
-        </p:nvSpPr>
-        <p:spPr>
-          <a:xfrm>
-            <a:off x="628650" y="1825625"/>
-            <a:ext cx="7886700" cy="4351338"/>
-          </a:xfrm>
-          <a:prstGeom prst="rect">
-            <a:avLst/>
-          </a:prstGeom>
-        </p:spPr>
-        <p:txBody>
-          <a:bodyPr vert="horz" lIns="91440" tIns="45720" rIns="91440" bIns="45720" rtlCol="0">
-            <a:normAutofit/>
-          </a:bodyPr>
-          <a:lstStyle/>
-          <a:p>
-            <a:pPr lvl="0"/>
-            <a:r>
-              <a:rPr lang="de-DE"/>
-              <a:t>Formatvorlagen des Textmasters bearbeiten</a:t>
-            </a:r>
-          </a:p>
-          <a:p>
-            <a:pPr lvl="1"/>
-            <a:r>
-              <a:rPr lang="de-DE"/>
-              <a:t>Zweite Ebene</a:t>
-            </a:r>
-          </a:p>
-          <a:p>
-            <a:pPr lvl="2"/>
-            <a:r>
-              <a:rPr lang="de-DE"/>
-              <a:t>Dritte Ebene</a:t>
-            </a:r>
-          </a:p>
-          <a:p>
-            <a:pPr lvl="3"/>
-            <a:r>
-              <a:rPr lang="de-DE"/>
-              <a:t>Vierte Ebene</a:t>
-            </a:r>
-          </a:p>
-          <a:p>
-            <a:pPr lvl="4"/>
-            <a:r>
-              <a:rPr lang="de-DE"/>
-              <a:t>Fünfte Ebene</a:t>
-            </a:r>
-            <a:endParaRPr lang="de-DE"/>
-          </a:p>
-        </p:txBody>
-      </p:sp>
-      <p:sp>
-        <p:nvSpPr>
-          <p:cNvPr id="4" name="Datumsplatzhalter 3"/>
-          <p:cNvSpPr>
-            <a:spLocks noGrp="1"/>
-          </p:cNvSpPr>
-          <p:nvPr>
-            <p:ph type="dt" sz="half" idx="2"/>
-          </p:nvPr>
-        </p:nvSpPr>
-        <p:spPr>
-          <a:xfrm>
-            <a:off x="628650" y="6356351"/>
-            <a:ext cx="2057400" cy="365125"/>
-          </a:xfrm>
-          <a:prstGeom prst="rect">
-            <a:avLst/>
-          </a:prstGeom>
-        </p:spPr>
-        <p:txBody>
-          <a:bodyPr vert="horz" lIns="91440" tIns="45720" rIns="91440" bIns="45720" rtlCol="0" anchor="ctr"/>
-          <a:lstStyle>
-            <a:lvl1pPr algn="l">
-              <a:defRPr sz="900">
-                <a:solidFill>
-                  <a:schemeClr val="tx1">
-                    <a:tint val="75000"/>
-                  </a:schemeClr>
-                </a:solidFill>
-              </a:defRPr>
-            </a:lvl1pPr>
-          </a:lstStyle>
-          <a:p>
-            <a:fld id="{B3445E76-26B6-4A8B-B192-51A011EE4635}" type="datetime1">
-              <a:rPr lang="en-US" smtClean="0"/>
-              <a:t>12/28/2016</a:t>
-            </a:fld>
-            <a:endParaRPr lang="en-US" dirty="0"/>
-          </a:p>
-        </p:txBody>
-      </p:sp>
-      <p:sp>
-        <p:nvSpPr>
-          <p:cNvPr id="5" name="Fußzeilenplatzhalter 4"/>
-          <p:cNvSpPr>
-            <a:spLocks noGrp="1"/>
-          </p:cNvSpPr>
-          <p:nvPr>
-            <p:ph type="ftr" sz="quarter" idx="3"/>
-          </p:nvPr>
-        </p:nvSpPr>
-        <p:spPr>
-          <a:xfrm>
-            <a:off x="3028950" y="6356351"/>
-            <a:ext cx="3086100" cy="365125"/>
-          </a:xfrm>
-          <a:prstGeom prst="rect">
-            <a:avLst/>
-          </a:prstGeom>
-        </p:spPr>
-        <p:txBody>
-          <a:bodyPr vert="horz" lIns="91440" tIns="45720" rIns="91440" bIns="45720" rtlCol="0" anchor="ctr"/>
-          <a:lstStyle>
-            <a:lvl1pPr algn="ctr">
-              <a:defRPr sz="900">
-                <a:solidFill>
-                  <a:schemeClr val="tx1">
-                    <a:tint val="75000"/>
-                  </a:schemeClr>
-                </a:solidFill>
-              </a:defRPr>
-            </a:lvl1pPr>
-          </a:lstStyle>
-          <a:p>
-            <a:r>
-              <a:rPr lang="en-US"/>
-              <a:t>Slide Template</a:t>
-            </a:r>
-            <a:endParaRPr lang="en-US" dirty="0"/>
-          </a:p>
-        </p:txBody>
-      </p:sp>
-      <p:sp>
-        <p:nvSpPr>
-          <p:cNvPr id="6" name="Foliennummernplatzhalter 5"/>
-          <p:cNvSpPr>
-            <a:spLocks noGrp="1"/>
-          </p:cNvSpPr>
-          <p:nvPr>
-            <p:ph type="sldNum" sz="quarter" idx="4"/>
-          </p:nvPr>
-        </p:nvSpPr>
-        <p:spPr>
-          <a:xfrm>
-            <a:off x="6457950" y="6356351"/>
-            <a:ext cx="2057400" cy="365125"/>
-          </a:xfrm>
-          <a:prstGeom prst="rect">
-            <a:avLst/>
-          </a:prstGeom>
-        </p:spPr>
-        <p:txBody>
-          <a:bodyPr vert="horz" lIns="91440" tIns="45720" rIns="91440" bIns="45720" rtlCol="0" anchor="ctr"/>
-          <a:lstStyle>
-            <a:lvl1pPr algn="r">
-              <a:defRPr sz="900">
-                <a:solidFill>
-                  <a:schemeClr val="tx1">
-                    <a:tint val="75000"/>
-                  </a:schemeClr>
-                </a:solidFill>
-              </a:defRPr>
-            </a:lvl1pPr>
-          </a:lstStyle>
-          <a:p>
-            <a:fld id="{5C476CE9-DBD6-47B2-9488-80AA33A3CE56}" type="slidenum">
-              <a:rPr lang="en-US" smtClean="0"/>
-              <a:pPr/>
-              <a:t>‹Nr.›</a:t>
-            </a:fld>
-            <a:endParaRPr lang="en-US" dirty="0"/>
-          </a:p>
-        </p:txBody>
-      </p:sp>
-      <p:sp>
-        <p:nvSpPr>
           <p:cNvPr id="7" name="Rechteck 6"/>
           <p:cNvSpPr/>
           <p:nvPr userDrawn="1"/>
         </p:nvSpPr>
         <p:spPr>
           <a:xfrm>
-            <a:off x="0" y="6588000"/>
+            <a:off x="0" y="6621251"/>
             <a:ext cx="9144000" cy="306000"/>
           </a:xfrm>
           <a:prstGeom prst="rect">
@@ -5453,6 +4774,219 @@
           <a:p>
             <a:pPr algn="ctr"/>
             <a:endParaRPr lang="en-US"/>
+          </a:p>
+        </p:txBody>
+      </p:sp>
+      <p:sp>
+        <p:nvSpPr>
+          <p:cNvPr id="2" name="Titelplatzhalter 1"/>
+          <p:cNvSpPr>
+            <a:spLocks noGrp="1"/>
+          </p:cNvSpPr>
+          <p:nvPr>
+            <p:ph type="title"/>
+          </p:nvPr>
+        </p:nvSpPr>
+        <p:spPr>
+          <a:xfrm>
+            <a:off x="628650" y="365126"/>
+            <a:ext cx="7886700" cy="1325563"/>
+          </a:xfrm>
+          <a:prstGeom prst="rect">
+            <a:avLst/>
+          </a:prstGeom>
+        </p:spPr>
+        <p:txBody>
+          <a:bodyPr vert="horz" lIns="91440" tIns="45720" rIns="91440" bIns="45720" rtlCol="0" anchor="ctr">
+            <a:normAutofit/>
+          </a:bodyPr>
+          <a:lstStyle/>
+          <a:p>
+            <a:r>
+              <a:rPr lang="de-DE"/>
+              <a:t>Titelmasterformat durch Klicken bearbeiten</a:t>
+            </a:r>
+            <a:endParaRPr lang="de-DE"/>
+          </a:p>
+        </p:txBody>
+      </p:sp>
+      <p:sp>
+        <p:nvSpPr>
+          <p:cNvPr id="3" name="Textplatzhalter 2"/>
+          <p:cNvSpPr>
+            <a:spLocks noGrp="1"/>
+          </p:cNvSpPr>
+          <p:nvPr>
+            <p:ph type="body" idx="1"/>
+          </p:nvPr>
+        </p:nvSpPr>
+        <p:spPr>
+          <a:xfrm>
+            <a:off x="628650" y="1825625"/>
+            <a:ext cx="7886700" cy="4351338"/>
+          </a:xfrm>
+          <a:prstGeom prst="rect">
+            <a:avLst/>
+          </a:prstGeom>
+        </p:spPr>
+        <p:txBody>
+          <a:bodyPr vert="horz" lIns="91440" tIns="45720" rIns="91440" bIns="45720" rtlCol="0">
+            <a:normAutofit/>
+          </a:bodyPr>
+          <a:lstStyle/>
+          <a:p>
+            <a:pPr lvl="0"/>
+            <a:r>
+              <a:rPr lang="de-DE"/>
+              <a:t>Formatvorlagen des Textmasters bearbeiten</a:t>
+            </a:r>
+          </a:p>
+          <a:p>
+            <a:pPr lvl="1"/>
+            <a:r>
+              <a:rPr lang="de-DE"/>
+              <a:t>Zweite Ebene</a:t>
+            </a:r>
+          </a:p>
+          <a:p>
+            <a:pPr lvl="2"/>
+            <a:r>
+              <a:rPr lang="de-DE"/>
+              <a:t>Dritte Ebene</a:t>
+            </a:r>
+          </a:p>
+          <a:p>
+            <a:pPr lvl="3"/>
+            <a:r>
+              <a:rPr lang="de-DE"/>
+              <a:t>Vierte Ebene</a:t>
+            </a:r>
+          </a:p>
+          <a:p>
+            <a:pPr lvl="4"/>
+            <a:r>
+              <a:rPr lang="de-DE"/>
+              <a:t>Fünfte Ebene</a:t>
+            </a:r>
+            <a:endParaRPr lang="de-DE"/>
+          </a:p>
+        </p:txBody>
+      </p:sp>
+      <p:sp>
+        <p:nvSpPr>
+          <p:cNvPr id="4" name="Datumsplatzhalter 3"/>
+          <p:cNvSpPr>
+            <a:spLocks noGrp="1"/>
+          </p:cNvSpPr>
+          <p:nvPr>
+            <p:ph type="dt" sz="half" idx="2"/>
+          </p:nvPr>
+        </p:nvSpPr>
+        <p:spPr>
+          <a:xfrm>
+            <a:off x="485775" y="6629400"/>
+            <a:ext cx="2057400" cy="365125"/>
+          </a:xfrm>
+          <a:prstGeom prst="rect">
+            <a:avLst/>
+          </a:prstGeom>
+        </p:spPr>
+        <p:txBody>
+          <a:bodyPr vert="horz" lIns="91440" tIns="45720" rIns="91440" bIns="45720" rtlCol="0" anchor="ctr"/>
+          <a:lstStyle>
+            <a:lvl1pPr algn="l">
+              <a:defRPr sz="900">
+                <a:solidFill>
+                  <a:schemeClr val="tx1"/>
+                </a:solidFill>
+              </a:defRPr>
+            </a:lvl1pPr>
+          </a:lstStyle>
+          <a:p>
+            <a:fld id="{B3445E76-26B6-4A8B-B192-51A011EE4635}" type="datetime1">
+              <a:rPr lang="en-US" smtClean="0"/>
+              <a:pPr/>
+              <a:t>12/28/2016</a:t>
+            </a:fld>
+            <a:endParaRPr lang="en-US" dirty="0"/>
+          </a:p>
+        </p:txBody>
+      </p:sp>
+      <p:sp>
+        <p:nvSpPr>
+          <p:cNvPr id="5" name="Fußzeilenplatzhalter 4"/>
+          <p:cNvSpPr>
+            <a:spLocks noGrp="1"/>
+          </p:cNvSpPr>
+          <p:nvPr>
+            <p:ph type="ftr" sz="quarter" idx="3"/>
+          </p:nvPr>
+        </p:nvSpPr>
+        <p:spPr>
+          <a:xfrm>
+            <a:off x="3028950" y="6629401"/>
+            <a:ext cx="3086100" cy="365125"/>
+          </a:xfrm>
+          <a:prstGeom prst="rect">
+            <a:avLst/>
+          </a:prstGeom>
+        </p:spPr>
+        <p:txBody>
+          <a:bodyPr vert="horz" lIns="91440" tIns="45720" rIns="91440" bIns="45720" rtlCol="0" anchor="ctr"/>
+          <a:lstStyle>
+            <a:lvl1pPr algn="ctr">
+              <a:defRPr sz="900">
+                <a:solidFill>
+                  <a:schemeClr val="tx1"/>
+                </a:solidFill>
+              </a:defRPr>
+            </a:lvl1pPr>
+          </a:lstStyle>
+          <a:p>
+            <a:r>
+              <a:rPr lang="en-US" dirty="0"/>
+              <a:t>Slide Template</a:t>
+            </a:r>
+          </a:p>
+        </p:txBody>
+      </p:sp>
+      <p:sp>
+        <p:nvSpPr>
+          <p:cNvPr id="6" name="Foliennummernplatzhalter 5"/>
+          <p:cNvSpPr>
+            <a:spLocks noGrp="1"/>
+          </p:cNvSpPr>
+          <p:nvPr>
+            <p:ph type="sldNum" sz="quarter" idx="4"/>
+          </p:nvPr>
+        </p:nvSpPr>
+        <p:spPr>
+          <a:xfrm>
+            <a:off x="6457950" y="6629401"/>
+            <a:ext cx="2057400" cy="365125"/>
+          </a:xfrm>
+          <a:prstGeom prst="rect">
+            <a:avLst/>
+          </a:prstGeom>
+        </p:spPr>
+        <p:txBody>
+          <a:bodyPr vert="horz" lIns="91440" tIns="45720" rIns="91440" bIns="45720" rtlCol="0" anchor="ctr"/>
+          <a:lstStyle>
+            <a:lvl1pPr algn="r">
+              <a:defRPr sz="900">
+                <a:solidFill>
+                  <a:schemeClr val="tx1"/>
+                </a:solidFill>
+              </a:defRPr>
+            </a:lvl1pPr>
+          </a:lstStyle>
+          <a:p>
+            <a:fld id="{5C476CE9-DBD6-47B2-9488-80AA33A3CE56}" type="slidenum">
+              <a:rPr lang="en-US" smtClean="0"/>
+              <a:pPr/>
+              <a:t>‹Nr.›</a:t>
+            </a:fld>
+            <a:endParaRPr lang="en-US" dirty="0"/>
           </a:p>
         </p:txBody>
       </p:sp>
@@ -6194,276 +5728,132 @@
           <a:p>
             <a:r>
               <a:rPr lang="de-DE" dirty="0"/>
-              <a:t>Title</a:t>
-            </a:r>
+              <a:t>Gliederung</a:t>
+            </a:r>
+          </a:p>
+        </p:txBody>
+      </p:sp>
+      <p:sp>
+        <p:nvSpPr>
+          <p:cNvPr id="3" name="Inhaltsplatzhalter 2"/>
+          <p:cNvSpPr>
+            <a:spLocks noGrp="1"/>
+          </p:cNvSpPr>
+          <p:nvPr>
+            <p:ph idx="1"/>
+          </p:nvPr>
+        </p:nvSpPr>
+        <p:spPr/>
+        <p:txBody>
+          <a:bodyPr/>
+          <a:lstStyle/>
+          <a:p>
+            <a:r>
+              <a:rPr lang="de-DE" dirty="0"/>
+              <a:t>Einführung</a:t>
+            </a:r>
+          </a:p>
+          <a:p>
+            <a:r>
+              <a:rPr lang="de-DE" dirty="0"/>
+              <a:t>Grundlagen des Konfigurationsmanagements</a:t>
+            </a:r>
+          </a:p>
+          <a:p>
+            <a:pPr lvl="1"/>
+            <a:r>
+              <a:rPr lang="de-DE" dirty="0"/>
+              <a:t>Konfigurationsidentifizierung</a:t>
+            </a:r>
+          </a:p>
+          <a:p>
+            <a:pPr lvl="1"/>
+            <a:r>
+              <a:rPr lang="de-DE" dirty="0"/>
+              <a:t>Konfigurationsüberwachung</a:t>
+            </a:r>
+          </a:p>
+          <a:p>
+            <a:pPr lvl="1"/>
+            <a:r>
+              <a:rPr lang="de-DE" dirty="0"/>
+              <a:t>Konfigurationsbuchführung</a:t>
+            </a:r>
+          </a:p>
+          <a:p>
+            <a:pPr lvl="1"/>
+            <a:r>
+              <a:rPr lang="de-DE" dirty="0" err="1"/>
+              <a:t>Konfigurationsauditierung</a:t>
+            </a:r>
+            <a:endParaRPr lang="de-DE" dirty="0"/>
+          </a:p>
+        </p:txBody>
+      </p:sp>
+      <p:sp>
+        <p:nvSpPr>
+          <p:cNvPr id="4" name="Foliennummernplatzhalter 3"/>
+          <p:cNvSpPr>
+            <a:spLocks noGrp="1"/>
+          </p:cNvSpPr>
+          <p:nvPr>
+            <p:ph type="sldNum" sz="quarter" idx="12"/>
+          </p:nvPr>
+        </p:nvSpPr>
+        <p:spPr/>
+        <p:txBody>
+          <a:bodyPr/>
+          <a:lstStyle/>
+          <a:p>
+            <a:fld id="{5C476CE9-DBD6-47B2-9488-80AA33A3CE56}" type="slidenum">
+              <a:rPr lang="en-US" smtClean="0"/>
+              <a:pPr/>
+              <a:t>2</a:t>
+            </a:fld>
             <a:endParaRPr lang="en-US" dirty="0"/>
           </a:p>
         </p:txBody>
       </p:sp>
-      <p:sp>
-        <p:nvSpPr>
-          <p:cNvPr id="12" name="Inhaltsplatzhalter 11"/>
-          <p:cNvSpPr>
-            <a:spLocks noGrp="1"/>
-          </p:cNvSpPr>
-          <p:nvPr>
-            <p:ph idx="1"/>
-          </p:nvPr>
-        </p:nvSpPr>
-        <p:spPr/>
-        <p:txBody>
-          <a:bodyPr/>
-          <a:lstStyle/>
-          <a:p>
-            <a:endParaRPr lang="de-DE" dirty="0"/>
-          </a:p>
-        </p:txBody>
-      </p:sp>
-      <p:sp>
-        <p:nvSpPr>
-          <p:cNvPr id="7" name="Rechteck 6"/>
-          <p:cNvSpPr/>
+      <p:pic>
+        <p:nvPicPr>
+          <p:cNvPr id="5" name="Bildplatzhalter 8"/>
+          <p:cNvPicPr>
+            <a:picLocks noChangeAspect="1"/>
+          </p:cNvPicPr>
           <p:nvPr/>
-        </p:nvSpPr>
+        </p:nvPicPr>
+        <p:blipFill>
+          <a:blip r:embed="rId2">
+            <a:extLst>
+              <a:ext uri="{28A0092B-C50C-407E-A947-70E740481C1C}">
+                <a14:useLocalDpi xmlns:a14="http://schemas.microsoft.com/office/drawing/2010/main" val="0"/>
+              </a:ext>
+            </a:extLst>
+          </a:blip>
+          <a:stretch>
+            <a:fillRect/>
+          </a:stretch>
+        </p:blipFill>
         <p:spPr>
           <a:xfrm>
-            <a:off x="1809986" y="6582602"/>
-            <a:ext cx="1828800" cy="291346"/>
+            <a:off x="7010400" y="3737254"/>
+            <a:ext cx="1814902" cy="2627827"/>
           </a:xfrm>
           <a:prstGeom prst="rect">
             <a:avLst/>
           </a:prstGeom>
-          <a:solidFill>
-            <a:schemeClr val="bg1"/>
-          </a:solidFill>
-          <a:ln>
-            <a:solidFill>
-              <a:schemeClr val="tx2">
-                <a:lumMod val="75000"/>
-              </a:schemeClr>
-            </a:solidFill>
-          </a:ln>
         </p:spPr>
-        <p:style>
-          <a:lnRef idx="2">
-            <a:schemeClr val="accent1">
-              <a:shade val="50000"/>
-            </a:schemeClr>
-          </a:lnRef>
-          <a:fillRef idx="1">
-            <a:schemeClr val="accent1"/>
-          </a:fillRef>
-          <a:effectRef idx="0">
-            <a:schemeClr val="accent1"/>
-          </a:effectRef>
-          <a:fontRef idx="minor">
-            <a:schemeClr val="lt1"/>
-          </a:fontRef>
-        </p:style>
-        <p:txBody>
-          <a:bodyPr rtlCol="0" anchor="ctr"/>
-          <a:lstStyle/>
-          <a:p>
-            <a:pPr algn="ctr"/>
-            <a:endParaRPr lang="en-US"/>
-          </a:p>
-        </p:txBody>
-      </p:sp>
-      <p:sp>
-        <p:nvSpPr>
-          <p:cNvPr id="9" name="Textfeld 8"/>
-          <p:cNvSpPr txBox="1"/>
-          <p:nvPr/>
-        </p:nvSpPr>
-        <p:spPr bwMode="auto">
-          <a:xfrm>
-            <a:off x="2326250" y="6567550"/>
-            <a:ext cx="801181" cy="307777"/>
-          </a:xfrm>
-          <a:prstGeom prst="rect">
-            <a:avLst/>
-          </a:prstGeom>
-          <a:noFill/>
-          <a:ln>
-            <a:noFill/>
-          </a:ln>
-        </p:spPr>
-        <p:style>
-          <a:lnRef idx="2">
-            <a:schemeClr val="accent3"/>
-          </a:lnRef>
-          <a:fillRef idx="1">
-            <a:schemeClr val="lt1"/>
-          </a:fillRef>
-          <a:effectRef idx="0">
-            <a:schemeClr val="accent3"/>
-          </a:effectRef>
-          <a:fontRef idx="minor">
-            <a:schemeClr val="dk1"/>
-          </a:fontRef>
-        </p:style>
-        <p:txBody>
-          <a:bodyPr wrap="none">
-            <a:spAutoFit/>
-          </a:bodyPr>
-          <a:lstStyle/>
-          <a:p>
-            <a:pPr algn="ctr">
-              <a:defRPr/>
-            </a:pPr>
-            <a:r>
-              <a:rPr lang="en-US" sz="1400" dirty="0"/>
-              <a:t>Topic 1 </a:t>
-            </a:r>
-          </a:p>
-        </p:txBody>
-      </p:sp>
-      <p:sp>
-        <p:nvSpPr>
-          <p:cNvPr id="10" name="Textfeld 9"/>
-          <p:cNvSpPr txBox="1"/>
-          <p:nvPr/>
-        </p:nvSpPr>
-        <p:spPr bwMode="auto">
-          <a:xfrm>
-            <a:off x="4854220" y="6581706"/>
-            <a:ext cx="751488" cy="307777"/>
-          </a:xfrm>
-          <a:prstGeom prst="rect">
-            <a:avLst/>
-          </a:prstGeom>
-          <a:noFill/>
-          <a:ln>
-            <a:noFill/>
-          </a:ln>
-        </p:spPr>
-        <p:style>
-          <a:lnRef idx="2">
-            <a:schemeClr val="accent3"/>
-          </a:lnRef>
-          <a:fillRef idx="1">
-            <a:schemeClr val="lt1"/>
-          </a:fillRef>
-          <a:effectRef idx="0">
-            <a:schemeClr val="accent3"/>
-          </a:effectRef>
-          <a:fontRef idx="minor">
-            <a:schemeClr val="dk1"/>
-          </a:fontRef>
-        </p:style>
-        <p:txBody>
-          <a:bodyPr wrap="none">
-            <a:spAutoFit/>
-          </a:bodyPr>
-          <a:lstStyle/>
-          <a:p>
-            <a:pPr algn="ctr">
-              <a:defRPr/>
-            </a:pPr>
-            <a:r>
-              <a:rPr lang="en-US" sz="1400" dirty="0"/>
-              <a:t>Topic 2</a:t>
-            </a:r>
-          </a:p>
-        </p:txBody>
-      </p:sp>
-      <p:sp>
-        <p:nvSpPr>
-          <p:cNvPr id="11" name="Textfeld 10"/>
-          <p:cNvSpPr txBox="1"/>
-          <p:nvPr/>
-        </p:nvSpPr>
-        <p:spPr bwMode="auto">
-          <a:xfrm>
-            <a:off x="7396326" y="6581706"/>
-            <a:ext cx="751488" cy="307777"/>
-          </a:xfrm>
-          <a:prstGeom prst="rect">
-            <a:avLst/>
-          </a:prstGeom>
-          <a:noFill/>
-          <a:ln>
-            <a:noFill/>
-          </a:ln>
-        </p:spPr>
-        <p:style>
-          <a:lnRef idx="2">
-            <a:schemeClr val="accent3"/>
-          </a:lnRef>
-          <a:fillRef idx="1">
-            <a:schemeClr val="lt1"/>
-          </a:fillRef>
-          <a:effectRef idx="0">
-            <a:schemeClr val="accent3"/>
-          </a:effectRef>
-          <a:fontRef idx="minor">
-            <a:schemeClr val="dk1"/>
-          </a:fontRef>
-        </p:style>
-        <p:txBody>
-          <a:bodyPr wrap="none">
-            <a:spAutoFit/>
-          </a:bodyPr>
-          <a:lstStyle/>
-          <a:p>
-            <a:pPr algn="ctr">
-              <a:defRPr/>
-            </a:pPr>
-            <a:r>
-              <a:rPr lang="en-US" sz="1400" dirty="0"/>
-              <a:t>Topic 3</a:t>
-            </a:r>
-          </a:p>
-        </p:txBody>
-      </p:sp>
-      <p:sp>
-        <p:nvSpPr>
-          <p:cNvPr id="3" name="Foliennummernplatzhalter 2"/>
-          <p:cNvSpPr>
-            <a:spLocks noGrp="1"/>
-          </p:cNvSpPr>
-          <p:nvPr>
-            <p:ph type="sldNum" sz="quarter" idx="12"/>
-          </p:nvPr>
-        </p:nvSpPr>
-        <p:spPr>
-          <a:xfrm>
-            <a:off x="-35078" y="6557424"/>
-            <a:ext cx="416078" cy="348762"/>
-          </a:xfrm>
-        </p:spPr>
-        <p:txBody>
-          <a:bodyPr/>
-          <a:lstStyle/>
-          <a:p>
-            <a:fld id="{5C476CE9-DBD6-47B2-9488-80AA33A3CE56}" type="slidenum">
-              <a:rPr lang="en-US" sz="1400" smtClean="0">
-                <a:solidFill>
-                  <a:schemeClr val="tx1"/>
-                </a:solidFill>
-              </a:rPr>
-              <a:pPr/>
-              <a:t>2</a:t>
-            </a:fld>
-            <a:endParaRPr lang="en-US" sz="1400" dirty="0">
-              <a:solidFill>
-                <a:schemeClr val="tx1"/>
-              </a:solidFill>
-            </a:endParaRPr>
-          </a:p>
-        </p:txBody>
-      </p:sp>
+      </p:pic>
     </p:spTree>
     <p:extLst>
       <p:ext uri="{BB962C8B-B14F-4D97-AF65-F5344CB8AC3E}">
-        <p14:creationId xmlns:p14="http://schemas.microsoft.com/office/powerpoint/2010/main" val="2982503367"/>
+        <p14:creationId xmlns:p14="http://schemas.microsoft.com/office/powerpoint/2010/main" val="2689413627"/>
       </p:ext>
     </p:extLst>
   </p:cSld>
   <p:clrMapOvr>
     <a:masterClrMapping/>
   </p:clrMapOvr>
-  <p:transition/>
 </p:sld>
 </file>
 
@@ -6500,283 +5890,75 @@
           <a:lstStyle/>
           <a:p>
             <a:r>
-              <a:rPr lang="de-DE" dirty="0"/>
-              <a:t>Title</a:t>
-            </a:r>
-            <a:endParaRPr lang="en-US" dirty="0"/>
-          </a:p>
-        </p:txBody>
-      </p:sp>
-      <p:sp>
-        <p:nvSpPr>
-          <p:cNvPr id="12" name="Inhaltsplatzhalter 11"/>
+              <a:rPr lang="de-DE" sz="3200" dirty="0"/>
+              <a:t>Einführung</a:t>
+            </a:r>
+            <a:endParaRPr lang="de-DE" dirty="0"/>
+          </a:p>
+        </p:txBody>
+      </p:sp>
+      <p:sp>
+        <p:nvSpPr>
+          <p:cNvPr id="3" name="Inhaltsplatzhalter 2"/>
           <p:cNvSpPr>
             <a:spLocks noGrp="1"/>
           </p:cNvSpPr>
           <p:nvPr>
             <p:ph idx="1"/>
           </p:nvPr>
-        </p:nvSpPr>
-        <p:spPr/>
-        <p:txBody>
-          <a:bodyPr/>
-          <a:lstStyle/>
-          <a:p>
-            <a:endParaRPr lang="de-DE" dirty="0"/>
-          </a:p>
-        </p:txBody>
-      </p:sp>
-      <p:sp>
-        <p:nvSpPr>
-          <p:cNvPr id="7" name="Rechteck 6"/>
-          <p:cNvSpPr/>
-          <p:nvPr/>
         </p:nvSpPr>
         <p:spPr>
           <a:xfrm>
-            <a:off x="4267200" y="6582602"/>
-            <a:ext cx="1828800" cy="291346"/>
+            <a:off x="628650" y="1825625"/>
+            <a:ext cx="5467350" cy="4351338"/>
           </a:xfrm>
-          <a:prstGeom prst="rect">
-            <a:avLst/>
-          </a:prstGeom>
-          <a:solidFill>
-            <a:schemeClr val="bg1"/>
-          </a:solidFill>
-          <a:ln>
-            <a:solidFill>
-              <a:schemeClr val="tx2">
-                <a:lumMod val="75000"/>
-              </a:schemeClr>
-            </a:solidFill>
-          </a:ln>
         </p:spPr>
-        <p:style>
-          <a:lnRef idx="2">
-            <a:schemeClr val="accent1">
-              <a:shade val="50000"/>
-            </a:schemeClr>
-          </a:lnRef>
-          <a:fillRef idx="1">
-            <a:schemeClr val="accent1"/>
-          </a:fillRef>
-          <a:effectRef idx="0">
-            <a:schemeClr val="accent1"/>
-          </a:effectRef>
-          <a:fontRef idx="minor">
-            <a:schemeClr val="lt1"/>
-          </a:fontRef>
-        </p:style>
-        <p:txBody>
-          <a:bodyPr rtlCol="0" anchor="ctr"/>
-          <a:lstStyle/>
-          <a:p>
-            <a:pPr algn="ctr"/>
-            <a:endParaRPr lang="en-US"/>
-          </a:p>
-        </p:txBody>
-      </p:sp>
-      <p:sp>
-        <p:nvSpPr>
-          <p:cNvPr id="8" name="Textfeld 7"/>
-          <p:cNvSpPr txBox="1"/>
-          <p:nvPr/>
-        </p:nvSpPr>
-        <p:spPr>
-          <a:xfrm>
-            <a:off x="8039" y="6579933"/>
-            <a:ext cx="1355941" cy="307777"/>
-          </a:xfrm>
-          <a:prstGeom prst="rect">
-            <a:avLst/>
-          </a:prstGeom>
-          <a:noFill/>
-        </p:spPr>
-        <p:txBody>
-          <a:bodyPr wrap="square" rtlCol="0">
-            <a:spAutoFit/>
-          </a:bodyPr>
-          <a:lstStyle/>
-          <a:p>
-            <a:pPr defTabSz="914400" fontAlgn="base">
-              <a:spcBef>
-                <a:spcPct val="0"/>
-              </a:spcBef>
-              <a:spcAft>
-                <a:spcPct val="0"/>
-              </a:spcAft>
-            </a:pPr>
-            <a:fld id="{7142A130-6881-4DD8-A7E8-D028B026B051}" type="slidenum">
-              <a:rPr lang="en-US" sz="1400" smtClean="0">
-                <a:solidFill>
-                  <a:srgbClr val="000000"/>
-                </a:solidFill>
-                <a:cs typeface="Gisha" panose="020B0502040204020203" pitchFamily="34" charset="-79"/>
-              </a:rPr>
-              <a:t>3</a:t>
-            </a:fld>
-            <a:r>
-              <a:rPr lang="en-US" sz="1400" dirty="0">
-                <a:solidFill>
-                  <a:srgbClr val="000000"/>
-                </a:solidFill>
-                <a:cs typeface="Gisha" pitchFamily="34" charset="-79"/>
-              </a:rPr>
-              <a:t>   S. Kounev</a:t>
-            </a:r>
-          </a:p>
-        </p:txBody>
-      </p:sp>
-      <p:sp>
-        <p:nvSpPr>
-          <p:cNvPr id="9" name="Textfeld 8"/>
-          <p:cNvSpPr txBox="1"/>
-          <p:nvPr/>
-        </p:nvSpPr>
-        <p:spPr bwMode="auto">
-          <a:xfrm>
-            <a:off x="2326250" y="6567550"/>
-            <a:ext cx="801181" cy="307777"/>
-          </a:xfrm>
-          <a:prstGeom prst="rect">
-            <a:avLst/>
-          </a:prstGeom>
-          <a:noFill/>
-          <a:ln>
-            <a:noFill/>
-          </a:ln>
-        </p:spPr>
-        <p:style>
-          <a:lnRef idx="2">
-            <a:schemeClr val="accent3"/>
-          </a:lnRef>
-          <a:fillRef idx="1">
-            <a:schemeClr val="lt1"/>
-          </a:fillRef>
-          <a:effectRef idx="0">
-            <a:schemeClr val="accent3"/>
-          </a:effectRef>
-          <a:fontRef idx="minor">
-            <a:schemeClr val="dk1"/>
-          </a:fontRef>
-        </p:style>
-        <p:txBody>
-          <a:bodyPr wrap="none">
-            <a:spAutoFit/>
-          </a:bodyPr>
-          <a:lstStyle/>
-          <a:p>
-            <a:pPr algn="ctr">
-              <a:defRPr/>
-            </a:pPr>
-            <a:r>
-              <a:rPr lang="en-US" sz="1400" dirty="0"/>
-              <a:t>Topic 1 </a:t>
-            </a:r>
-          </a:p>
-        </p:txBody>
-      </p:sp>
-      <p:sp>
-        <p:nvSpPr>
-          <p:cNvPr id="10" name="Textfeld 9"/>
-          <p:cNvSpPr txBox="1"/>
-          <p:nvPr/>
-        </p:nvSpPr>
-        <p:spPr bwMode="auto">
-          <a:xfrm>
-            <a:off x="4854220" y="6581706"/>
-            <a:ext cx="751488" cy="307777"/>
-          </a:xfrm>
-          <a:prstGeom prst="rect">
-            <a:avLst/>
-          </a:prstGeom>
-          <a:noFill/>
-          <a:ln>
-            <a:noFill/>
-          </a:ln>
-        </p:spPr>
-        <p:style>
-          <a:lnRef idx="2">
-            <a:schemeClr val="accent3"/>
-          </a:lnRef>
-          <a:fillRef idx="1">
-            <a:schemeClr val="lt1"/>
-          </a:fillRef>
-          <a:effectRef idx="0">
-            <a:schemeClr val="accent3"/>
-          </a:effectRef>
-          <a:fontRef idx="minor">
-            <a:schemeClr val="dk1"/>
-          </a:fontRef>
-        </p:style>
-        <p:txBody>
-          <a:bodyPr wrap="none">
-            <a:spAutoFit/>
-          </a:bodyPr>
-          <a:lstStyle/>
-          <a:p>
-            <a:pPr algn="ctr">
-              <a:defRPr/>
-            </a:pPr>
-            <a:r>
-              <a:rPr lang="en-US" sz="1400" dirty="0"/>
-              <a:t>Topic 2</a:t>
-            </a:r>
-          </a:p>
-        </p:txBody>
-      </p:sp>
-      <p:sp>
-        <p:nvSpPr>
-          <p:cNvPr id="11" name="Textfeld 10"/>
-          <p:cNvSpPr txBox="1"/>
-          <p:nvPr/>
-        </p:nvSpPr>
-        <p:spPr bwMode="auto">
-          <a:xfrm>
-            <a:off x="7396326" y="6581706"/>
-            <a:ext cx="751488" cy="307777"/>
-          </a:xfrm>
-          <a:prstGeom prst="rect">
-            <a:avLst/>
-          </a:prstGeom>
-          <a:noFill/>
-          <a:ln>
-            <a:noFill/>
-          </a:ln>
-        </p:spPr>
-        <p:style>
-          <a:lnRef idx="2">
-            <a:schemeClr val="accent3"/>
-          </a:lnRef>
-          <a:fillRef idx="1">
-            <a:schemeClr val="lt1"/>
-          </a:fillRef>
-          <a:effectRef idx="0">
-            <a:schemeClr val="accent3"/>
-          </a:effectRef>
-          <a:fontRef idx="minor">
-            <a:schemeClr val="dk1"/>
-          </a:fontRef>
-        </p:style>
-        <p:txBody>
-          <a:bodyPr wrap="none">
-            <a:spAutoFit/>
-          </a:bodyPr>
-          <a:lstStyle/>
-          <a:p>
-            <a:pPr algn="ctr">
-              <a:defRPr/>
-            </a:pPr>
-            <a:r>
-              <a:rPr lang="en-US" sz="1400" dirty="0"/>
-              <a:t>Topic 3</a:t>
-            </a:r>
-          </a:p>
-        </p:txBody>
-      </p:sp>
-      <p:sp>
-        <p:nvSpPr>
-          <p:cNvPr id="3" name="Foliennummernplatzhalter 2"/>
+        <p:txBody>
+          <a:bodyPr/>
+          <a:lstStyle/>
+          <a:p>
+            <a:r>
+              <a:rPr lang="de-DE" dirty="0"/>
+              <a:t>US-Militär führt Versuche mit Flugkörpern in den 1950er Jahren durch</a:t>
+            </a:r>
+          </a:p>
+          <a:p>
+            <a:r>
+              <a:rPr lang="de-DE" dirty="0"/>
+              <a:t>Viele verschiedene Konfigurationen werden getestet</a:t>
+            </a:r>
+          </a:p>
+          <a:p>
+            <a:r>
+              <a:rPr lang="de-DE" dirty="0"/>
+              <a:t>Probleme:</a:t>
+            </a:r>
+          </a:p>
+          <a:p>
+            <a:pPr lvl="1"/>
+            <a:r>
+              <a:rPr lang="de-DE" dirty="0"/>
+              <a:t>Flugkörper nach Test (meist) zerstört</a:t>
+            </a:r>
+          </a:p>
+          <a:p>
+            <a:pPr lvl="1"/>
+            <a:r>
+              <a:rPr lang="de-DE" dirty="0"/>
+              <a:t>Aufzeichnungen über Konfigurationen unzureichend</a:t>
+            </a:r>
+          </a:p>
+          <a:p>
+            <a:r>
+              <a:rPr lang="de-DE" dirty="0"/>
+              <a:t>Lösung: Konfigurationsmanagementstandards</a:t>
+            </a:r>
+          </a:p>
+        </p:txBody>
+      </p:sp>
+      <p:sp>
+        <p:nvSpPr>
+          <p:cNvPr id="4" name="Foliennummernplatzhalter 3"/>
           <p:cNvSpPr>
             <a:spLocks noGrp="1"/>
           </p:cNvSpPr>
@@ -6798,643 +5980,40 @@
           </a:p>
         </p:txBody>
       </p:sp>
-    </p:spTree>
-    <p:extLst>
-      <p:ext uri="{BB962C8B-B14F-4D97-AF65-F5344CB8AC3E}">
-        <p14:creationId xmlns:p14="http://schemas.microsoft.com/office/powerpoint/2010/main" val="1818309058"/>
-      </p:ext>
-    </p:extLst>
-  </p:cSld>
-  <p:clrMapOvr>
-    <a:masterClrMapping/>
-  </p:clrMapOvr>
-  <p:transition/>
-</p:sld>
-</file>
-
-<file path=ppt/slides/slide4.xml><?xml version="1.0" encoding="utf-8"?>
-<p:sld xmlns:a="http://schemas.openxmlformats.org/drawingml/2006/main" xmlns:r="http://schemas.openxmlformats.org/officeDocument/2006/relationships" xmlns:p="http://schemas.openxmlformats.org/presentationml/2006/main">
-  <p:cSld>
-    <p:spTree>
-      <p:nvGrpSpPr>
-        <p:cNvPr id="1" name=""/>
-        <p:cNvGrpSpPr/>
-        <p:nvPr/>
-      </p:nvGrpSpPr>
-      <p:grpSpPr>
-        <a:xfrm>
-          <a:off x="0" y="0"/>
-          <a:ext cx="0" cy="0"/>
-          <a:chOff x="0" y="0"/>
-          <a:chExt cx="0" cy="0"/>
-        </a:xfrm>
-      </p:grpSpPr>
-      <p:sp>
-        <p:nvSpPr>
-          <p:cNvPr id="2" name="Titel 1"/>
-          <p:cNvSpPr>
-            <a:spLocks noGrp="1"/>
-          </p:cNvSpPr>
-          <p:nvPr>
-            <p:ph type="title"/>
-          </p:nvPr>
-        </p:nvSpPr>
-        <p:spPr/>
-        <p:txBody>
-          <a:bodyPr/>
-          <a:lstStyle/>
-          <a:p>
-            <a:r>
-              <a:rPr lang="de-DE" dirty="0"/>
-              <a:t>Title</a:t>
-            </a:r>
-            <a:endParaRPr lang="en-US" dirty="0"/>
-          </a:p>
-        </p:txBody>
-      </p:sp>
-      <p:sp>
-        <p:nvSpPr>
-          <p:cNvPr id="12" name="Inhaltsplatzhalter 11"/>
-          <p:cNvSpPr>
-            <a:spLocks noGrp="1"/>
-          </p:cNvSpPr>
-          <p:nvPr>
-            <p:ph idx="1"/>
-          </p:nvPr>
-        </p:nvSpPr>
-        <p:spPr/>
-        <p:txBody>
-          <a:bodyPr/>
-          <a:lstStyle/>
-          <a:p>
-            <a:endParaRPr lang="de-DE"/>
-          </a:p>
-        </p:txBody>
-      </p:sp>
-      <p:sp>
-        <p:nvSpPr>
-          <p:cNvPr id="7" name="Rechteck 6"/>
-          <p:cNvSpPr/>
+      <p:pic>
+        <p:nvPicPr>
+          <p:cNvPr id="5" name="Grafik 4"/>
+          <p:cNvPicPr>
+            <a:picLocks noChangeAspect="1"/>
+          </p:cNvPicPr>
           <p:nvPr/>
-        </p:nvSpPr>
+        </p:nvPicPr>
+        <p:blipFill>
+          <a:blip r:embed="rId3" cstate="print">
+            <a:extLst>
+              <a:ext uri="{28A0092B-C50C-407E-A947-70E740481C1C}">
+                <a14:useLocalDpi xmlns:a14="http://schemas.microsoft.com/office/drawing/2010/main" val="0"/>
+              </a:ext>
+            </a:extLst>
+          </a:blip>
+          <a:stretch>
+            <a:fillRect/>
+          </a:stretch>
+        </p:blipFill>
         <p:spPr>
           <a:xfrm>
-            <a:off x="6858000" y="6582602"/>
-            <a:ext cx="1828800" cy="291346"/>
+            <a:off x="5847347" y="1690689"/>
+            <a:ext cx="3085461" cy="2445544"/>
           </a:xfrm>
           <a:prstGeom prst="rect">
             <a:avLst/>
           </a:prstGeom>
-          <a:solidFill>
-            <a:schemeClr val="bg1"/>
-          </a:solidFill>
-          <a:ln>
-            <a:solidFill>
-              <a:schemeClr val="tx2">
-                <a:lumMod val="75000"/>
-              </a:schemeClr>
-            </a:solidFill>
-          </a:ln>
         </p:spPr>
-        <p:style>
-          <a:lnRef idx="2">
-            <a:schemeClr val="accent1">
-              <a:shade val="50000"/>
-            </a:schemeClr>
-          </a:lnRef>
-          <a:fillRef idx="1">
-            <a:schemeClr val="accent1"/>
-          </a:fillRef>
-          <a:effectRef idx="0">
-            <a:schemeClr val="accent1"/>
-          </a:effectRef>
-          <a:fontRef idx="minor">
-            <a:schemeClr val="lt1"/>
-          </a:fontRef>
-        </p:style>
-        <p:txBody>
-          <a:bodyPr rtlCol="0" anchor="ctr"/>
-          <a:lstStyle/>
-          <a:p>
-            <a:pPr algn="ctr"/>
-            <a:endParaRPr lang="en-US"/>
-          </a:p>
-        </p:txBody>
-      </p:sp>
-      <p:sp>
-        <p:nvSpPr>
-          <p:cNvPr id="8" name="Textfeld 7"/>
-          <p:cNvSpPr txBox="1"/>
-          <p:nvPr/>
-        </p:nvSpPr>
-        <p:spPr>
-          <a:xfrm>
-            <a:off x="8039" y="6579933"/>
-            <a:ext cx="1355941" cy="307777"/>
-          </a:xfrm>
-          <a:prstGeom prst="rect">
-            <a:avLst/>
-          </a:prstGeom>
-          <a:noFill/>
-        </p:spPr>
-        <p:txBody>
-          <a:bodyPr wrap="square" rtlCol="0">
-            <a:spAutoFit/>
-          </a:bodyPr>
-          <a:lstStyle/>
-          <a:p>
-            <a:pPr defTabSz="914400" fontAlgn="base">
-              <a:spcBef>
-                <a:spcPct val="0"/>
-              </a:spcBef>
-              <a:spcAft>
-                <a:spcPct val="0"/>
-              </a:spcAft>
-            </a:pPr>
-            <a:fld id="{7142A130-6881-4DD8-A7E8-D028B026B051}" type="slidenum">
-              <a:rPr lang="en-US" sz="1400" smtClean="0">
-                <a:solidFill>
-                  <a:srgbClr val="000000"/>
-                </a:solidFill>
-                <a:cs typeface="Gisha" panose="020B0502040204020203" pitchFamily="34" charset="-79"/>
-              </a:rPr>
-              <a:t>4</a:t>
-            </a:fld>
-            <a:r>
-              <a:rPr lang="en-US" sz="1400" dirty="0">
-                <a:solidFill>
-                  <a:srgbClr val="000000"/>
-                </a:solidFill>
-                <a:cs typeface="Gisha" pitchFamily="34" charset="-79"/>
-              </a:rPr>
-              <a:t>   S. Kounev</a:t>
-            </a:r>
-          </a:p>
-        </p:txBody>
-      </p:sp>
-      <p:sp>
-        <p:nvSpPr>
-          <p:cNvPr id="9" name="Textfeld 8"/>
-          <p:cNvSpPr txBox="1"/>
-          <p:nvPr/>
-        </p:nvSpPr>
-        <p:spPr bwMode="auto">
-          <a:xfrm>
-            <a:off x="2326250" y="6567550"/>
-            <a:ext cx="801181" cy="307777"/>
-          </a:xfrm>
-          <a:prstGeom prst="rect">
-            <a:avLst/>
-          </a:prstGeom>
-          <a:noFill/>
-          <a:ln>
-            <a:noFill/>
-          </a:ln>
-        </p:spPr>
-        <p:style>
-          <a:lnRef idx="2">
-            <a:schemeClr val="accent3"/>
-          </a:lnRef>
-          <a:fillRef idx="1">
-            <a:schemeClr val="lt1"/>
-          </a:fillRef>
-          <a:effectRef idx="0">
-            <a:schemeClr val="accent3"/>
-          </a:effectRef>
-          <a:fontRef idx="minor">
-            <a:schemeClr val="dk1"/>
-          </a:fontRef>
-        </p:style>
-        <p:txBody>
-          <a:bodyPr wrap="none">
-            <a:spAutoFit/>
-          </a:bodyPr>
-          <a:lstStyle/>
-          <a:p>
-            <a:pPr algn="ctr">
-              <a:defRPr/>
-            </a:pPr>
-            <a:r>
-              <a:rPr lang="en-US" sz="1400" dirty="0"/>
-              <a:t>Topic 1 </a:t>
-            </a:r>
-          </a:p>
-        </p:txBody>
-      </p:sp>
-      <p:sp>
-        <p:nvSpPr>
-          <p:cNvPr id="10" name="Textfeld 9"/>
-          <p:cNvSpPr txBox="1"/>
-          <p:nvPr/>
-        </p:nvSpPr>
-        <p:spPr bwMode="auto">
-          <a:xfrm>
-            <a:off x="4854220" y="6581706"/>
-            <a:ext cx="751488" cy="307777"/>
-          </a:xfrm>
-          <a:prstGeom prst="rect">
-            <a:avLst/>
-          </a:prstGeom>
-          <a:noFill/>
-          <a:ln>
-            <a:noFill/>
-          </a:ln>
-        </p:spPr>
-        <p:style>
-          <a:lnRef idx="2">
-            <a:schemeClr val="accent3"/>
-          </a:lnRef>
-          <a:fillRef idx="1">
-            <a:schemeClr val="lt1"/>
-          </a:fillRef>
-          <a:effectRef idx="0">
-            <a:schemeClr val="accent3"/>
-          </a:effectRef>
-          <a:fontRef idx="minor">
-            <a:schemeClr val="dk1"/>
-          </a:fontRef>
-        </p:style>
-        <p:txBody>
-          <a:bodyPr wrap="none">
-            <a:spAutoFit/>
-          </a:bodyPr>
-          <a:lstStyle/>
-          <a:p>
-            <a:pPr algn="ctr">
-              <a:defRPr/>
-            </a:pPr>
-            <a:r>
-              <a:rPr lang="en-US" sz="1400" dirty="0"/>
-              <a:t>Topic 2</a:t>
-            </a:r>
-          </a:p>
-        </p:txBody>
-      </p:sp>
-      <p:sp>
-        <p:nvSpPr>
-          <p:cNvPr id="11" name="Textfeld 10"/>
-          <p:cNvSpPr txBox="1"/>
-          <p:nvPr/>
-        </p:nvSpPr>
-        <p:spPr bwMode="auto">
-          <a:xfrm>
-            <a:off x="7396326" y="6581706"/>
-            <a:ext cx="751488" cy="307777"/>
-          </a:xfrm>
-          <a:prstGeom prst="rect">
-            <a:avLst/>
-          </a:prstGeom>
-          <a:noFill/>
-          <a:ln>
-            <a:noFill/>
-          </a:ln>
-        </p:spPr>
-        <p:style>
-          <a:lnRef idx="2">
-            <a:schemeClr val="accent3"/>
-          </a:lnRef>
-          <a:fillRef idx="1">
-            <a:schemeClr val="lt1"/>
-          </a:fillRef>
-          <a:effectRef idx="0">
-            <a:schemeClr val="accent3"/>
-          </a:effectRef>
-          <a:fontRef idx="minor">
-            <a:schemeClr val="dk1"/>
-          </a:fontRef>
-        </p:style>
-        <p:txBody>
-          <a:bodyPr wrap="none">
-            <a:spAutoFit/>
-          </a:bodyPr>
-          <a:lstStyle/>
-          <a:p>
-            <a:pPr algn="ctr">
-              <a:defRPr/>
-            </a:pPr>
-            <a:r>
-              <a:rPr lang="en-US" sz="1400" dirty="0"/>
-              <a:t>Topic 3</a:t>
-            </a:r>
-          </a:p>
-        </p:txBody>
-      </p:sp>
-      <p:sp>
-        <p:nvSpPr>
-          <p:cNvPr id="3" name="Foliennummernplatzhalter 2"/>
-          <p:cNvSpPr>
-            <a:spLocks noGrp="1"/>
-          </p:cNvSpPr>
-          <p:nvPr>
-            <p:ph type="sldNum" sz="quarter" idx="12"/>
-          </p:nvPr>
-        </p:nvSpPr>
-        <p:spPr/>
-        <p:txBody>
-          <a:bodyPr/>
-          <a:lstStyle/>
-          <a:p>
-            <a:fld id="{5C476CE9-DBD6-47B2-9488-80AA33A3CE56}" type="slidenum">
-              <a:rPr lang="en-US" smtClean="0"/>
-              <a:pPr/>
-              <a:t>4</a:t>
-            </a:fld>
-            <a:endParaRPr lang="en-US" dirty="0"/>
-          </a:p>
-        </p:txBody>
-      </p:sp>
+      </p:pic>
     </p:spTree>
     <p:extLst>
       <p:ext uri="{BB962C8B-B14F-4D97-AF65-F5344CB8AC3E}">
-        <p14:creationId xmlns:p14="http://schemas.microsoft.com/office/powerpoint/2010/main" val="2572264147"/>
-      </p:ext>
-    </p:extLst>
-  </p:cSld>
-  <p:clrMapOvr>
-    <a:masterClrMapping/>
-  </p:clrMapOvr>
-  <p:transition/>
-</p:sld>
-</file>
-
-<file path=ppt/slides/slide5.xml><?xml version="1.0" encoding="utf-8"?>
-<p:sld xmlns:a="http://schemas.openxmlformats.org/drawingml/2006/main" xmlns:r="http://schemas.openxmlformats.org/officeDocument/2006/relationships" xmlns:p="http://schemas.openxmlformats.org/presentationml/2006/main">
-  <p:cSld>
-    <p:spTree>
-      <p:nvGrpSpPr>
-        <p:cNvPr id="1" name=""/>
-        <p:cNvGrpSpPr/>
-        <p:nvPr/>
-      </p:nvGrpSpPr>
-      <p:grpSpPr>
-        <a:xfrm>
-          <a:off x="0" y="0"/>
-          <a:ext cx="0" cy="0"/>
-          <a:chOff x="0" y="0"/>
-          <a:chExt cx="0" cy="0"/>
-        </a:xfrm>
-      </p:grpSpPr>
-      <p:sp>
-        <p:nvSpPr>
-          <p:cNvPr id="2053" name="Rectangle 5"/>
-          <p:cNvSpPr>
-            <a:spLocks noGrp="1" noChangeArrowheads="1"/>
-          </p:cNvSpPr>
-          <p:nvPr>
-            <p:ph type="ctrTitle"/>
-          </p:nvPr>
-        </p:nvSpPr>
-        <p:spPr>
-          <a:xfrm>
-            <a:off x="1265582" y="2743200"/>
-            <a:ext cx="7553325" cy="1981200"/>
-          </a:xfrm>
-        </p:spPr>
-        <p:txBody>
-          <a:bodyPr/>
-          <a:lstStyle/>
-          <a:p>
-            <a:pPr algn="ctr"/>
-            <a:r>
-              <a:rPr lang="de-DE" sz="6000" b="1" dirty="0" err="1"/>
-              <a:t>Thank</a:t>
-            </a:r>
-            <a:r>
-              <a:rPr lang="de-DE" sz="6000" b="1" dirty="0"/>
-              <a:t> </a:t>
-            </a:r>
-            <a:r>
-              <a:rPr lang="de-DE" sz="6000" b="1" dirty="0" err="1"/>
-              <a:t>You</a:t>
-            </a:r>
-            <a:r>
-              <a:rPr lang="de-DE" sz="6000" b="1" dirty="0"/>
-              <a:t>!</a:t>
-            </a:r>
-          </a:p>
-        </p:txBody>
-      </p:sp>
-      <p:sp>
-        <p:nvSpPr>
-          <p:cNvPr id="8" name="Rectangle 5"/>
-          <p:cNvSpPr txBox="1">
-            <a:spLocks noChangeArrowheads="1"/>
-          </p:cNvSpPr>
-          <p:nvPr/>
-        </p:nvSpPr>
-        <p:spPr bwMode="auto">
-          <a:xfrm>
-            <a:off x="1066800" y="5867400"/>
-            <a:ext cx="7324725" cy="784830"/>
-          </a:xfrm>
-          <a:prstGeom prst="rect">
-            <a:avLst/>
-          </a:prstGeom>
-          <a:noFill/>
-          <a:ln>
-            <a:noFill/>
-          </a:ln>
-          <a:effectLst/>
-          <a:extLst>
-            <a:ext uri="{909E8E84-426E-40DD-AFC4-6F175D3DCCD1}">
-              <a14:hiddenFill xmlns:a14="http://schemas.microsoft.com/office/drawing/2010/main">
-                <a:solidFill>
-                  <a:schemeClr val="accent1"/>
-                </a:solidFill>
-              </a14:hiddenFill>
-            </a:ext>
-            <a:ext uri="{91240B29-F687-4F45-9708-019B960494DF}">
-              <a14:hiddenLine xmlns:a14="http://schemas.microsoft.com/office/drawing/2010/main" w="9525">
-                <a:solidFill>
-                  <a:schemeClr val="tx1"/>
-                </a:solidFill>
-                <a:miter lim="800000"/>
-                <a:headEnd/>
-                <a:tailEnd/>
-              </a14:hiddenLine>
-            </a:ext>
-            <a:ext uri="{AF507438-7753-43E0-B8FC-AC1667EBCBE1}">
-              <a14:hiddenEffects xmlns:a14="http://schemas.microsoft.com/office/drawing/2010/main">
-                <a:effectLst>
-                  <a:outerShdw dist="35921" dir="2700000" algn="ctr" rotWithShape="0">
-                    <a:schemeClr val="bg2"/>
-                  </a:outerShdw>
-                </a:effectLst>
-              </a14:hiddenEffects>
-            </a:ext>
-          </a:extLst>
-        </p:spPr>
-        <p:txBody>
-          <a:bodyPr vert="horz" wrap="square" lIns="91440" tIns="45720" rIns="91440" bIns="45720" numCol="1" anchor="t" anchorCtr="0" compatLnSpc="1">
-            <a:prstTxWarp prst="textNoShape">
-              <a:avLst/>
-            </a:prstTxWarp>
-            <a:spAutoFit/>
-          </a:bodyPr>
-          <a:lstStyle>
-            <a:lvl1pPr algn="l" rtl="0" fontAlgn="base">
-              <a:spcBef>
-                <a:spcPct val="0"/>
-              </a:spcBef>
-              <a:spcAft>
-                <a:spcPct val="0"/>
-              </a:spcAft>
-              <a:defRPr sz="2800" kern="1200">
-                <a:solidFill>
-                  <a:schemeClr val="bg1"/>
-                </a:solidFill>
-                <a:latin typeface="+mj-lt"/>
-                <a:ea typeface="+mj-ea"/>
-                <a:cs typeface="+mj-cs"/>
-              </a:defRPr>
-            </a:lvl1pPr>
-            <a:lvl2pPr algn="l" rtl="0" fontAlgn="base">
-              <a:spcBef>
-                <a:spcPct val="0"/>
-              </a:spcBef>
-              <a:spcAft>
-                <a:spcPct val="0"/>
-              </a:spcAft>
-              <a:defRPr sz="3600">
-                <a:solidFill>
-                  <a:schemeClr val="tx2"/>
-                </a:solidFill>
-                <a:latin typeface="Arial" panose="020B0604020202020204" pitchFamily="34" charset="0"/>
-              </a:defRPr>
-            </a:lvl2pPr>
-            <a:lvl3pPr algn="l" rtl="0" fontAlgn="base">
-              <a:spcBef>
-                <a:spcPct val="0"/>
-              </a:spcBef>
-              <a:spcAft>
-                <a:spcPct val="0"/>
-              </a:spcAft>
-              <a:defRPr sz="3600">
-                <a:solidFill>
-                  <a:schemeClr val="tx2"/>
-                </a:solidFill>
-                <a:latin typeface="Arial" panose="020B0604020202020204" pitchFamily="34" charset="0"/>
-              </a:defRPr>
-            </a:lvl3pPr>
-            <a:lvl4pPr algn="l" rtl="0" fontAlgn="base">
-              <a:spcBef>
-                <a:spcPct val="0"/>
-              </a:spcBef>
-              <a:spcAft>
-                <a:spcPct val="0"/>
-              </a:spcAft>
-              <a:defRPr sz="3600">
-                <a:solidFill>
-                  <a:schemeClr val="tx2"/>
-                </a:solidFill>
-                <a:latin typeface="Arial" panose="020B0604020202020204" pitchFamily="34" charset="0"/>
-              </a:defRPr>
-            </a:lvl4pPr>
-            <a:lvl5pPr algn="l" rtl="0" fontAlgn="base">
-              <a:spcBef>
-                <a:spcPct val="0"/>
-              </a:spcBef>
-              <a:spcAft>
-                <a:spcPct val="0"/>
-              </a:spcAft>
-              <a:defRPr sz="3600">
-                <a:solidFill>
-                  <a:schemeClr val="tx2"/>
-                </a:solidFill>
-                <a:latin typeface="Arial" panose="020B0604020202020204" pitchFamily="34" charset="0"/>
-              </a:defRPr>
-            </a:lvl5pPr>
-            <a:lvl6pPr marL="457200" algn="l" rtl="0" fontAlgn="base">
-              <a:spcBef>
-                <a:spcPct val="0"/>
-              </a:spcBef>
-              <a:spcAft>
-                <a:spcPct val="0"/>
-              </a:spcAft>
-              <a:defRPr sz="3600">
-                <a:solidFill>
-                  <a:schemeClr val="tx2"/>
-                </a:solidFill>
-                <a:latin typeface="Arial" panose="020B0604020202020204" pitchFamily="34" charset="0"/>
-              </a:defRPr>
-            </a:lvl6pPr>
-            <a:lvl7pPr marL="914400" algn="l" rtl="0" fontAlgn="base">
-              <a:spcBef>
-                <a:spcPct val="0"/>
-              </a:spcBef>
-              <a:spcAft>
-                <a:spcPct val="0"/>
-              </a:spcAft>
-              <a:defRPr sz="3600">
-                <a:solidFill>
-                  <a:schemeClr val="tx2"/>
-                </a:solidFill>
-                <a:latin typeface="Arial" panose="020B0604020202020204" pitchFamily="34" charset="0"/>
-              </a:defRPr>
-            </a:lvl7pPr>
-            <a:lvl8pPr marL="1371600" algn="l" rtl="0" fontAlgn="base">
-              <a:spcBef>
-                <a:spcPct val="0"/>
-              </a:spcBef>
-              <a:spcAft>
-                <a:spcPct val="0"/>
-              </a:spcAft>
-              <a:defRPr sz="3600">
-                <a:solidFill>
-                  <a:schemeClr val="tx2"/>
-                </a:solidFill>
-                <a:latin typeface="Arial" panose="020B0604020202020204" pitchFamily="34" charset="0"/>
-              </a:defRPr>
-            </a:lvl8pPr>
-            <a:lvl9pPr marL="1828800" algn="l" rtl="0" fontAlgn="base">
-              <a:spcBef>
-                <a:spcPct val="0"/>
-              </a:spcBef>
-              <a:spcAft>
-                <a:spcPct val="0"/>
-              </a:spcAft>
-              <a:defRPr sz="3600">
-                <a:solidFill>
-                  <a:schemeClr val="tx2"/>
-                </a:solidFill>
-                <a:latin typeface="Arial" panose="020B0604020202020204" pitchFamily="34" charset="0"/>
-              </a:defRPr>
-            </a:lvl9pPr>
-          </a:lstStyle>
-          <a:p>
-            <a:pPr>
-              <a:spcBef>
-                <a:spcPts val="600"/>
-              </a:spcBef>
-            </a:pPr>
-            <a:r>
-              <a:rPr lang="en-US" sz="2000" dirty="0">
-                <a:latin typeface="Arial" panose="020B0604020202020204" pitchFamily="34" charset="0"/>
-                <a:cs typeface="Arial" panose="020B0604020202020204" pitchFamily="34" charset="0"/>
-              </a:rPr>
-              <a:t>skounev@acm.org</a:t>
-            </a:r>
-          </a:p>
-          <a:p>
-            <a:pPr>
-              <a:spcBef>
-                <a:spcPts val="600"/>
-              </a:spcBef>
-            </a:pPr>
-            <a:r>
-              <a:rPr lang="en-US" sz="2000" dirty="0">
-                <a:latin typeface="Arial" panose="020B0604020202020204" pitchFamily="34" charset="0"/>
-                <a:cs typeface="Arial" panose="020B0604020202020204" pitchFamily="34" charset="0"/>
-              </a:rPr>
-              <a:t>http://se.informatik.uni-wuerzburg.de</a:t>
-            </a:r>
-          </a:p>
-        </p:txBody>
-      </p:sp>
-    </p:spTree>
-    <p:extLst>
-      <p:ext uri="{BB962C8B-B14F-4D97-AF65-F5344CB8AC3E}">
-        <p14:creationId xmlns:p14="http://schemas.microsoft.com/office/powerpoint/2010/main" val="1682100158"/>
+        <p14:creationId xmlns:p14="http://schemas.microsoft.com/office/powerpoint/2010/main" val="1307304839"/>
       </p:ext>
     </p:extLst>
   </p:cSld>

</xml_diff>

<commit_message>
basically finished first half of presentation
</commit_message>
<xml_diff>
--- a/Präsentation/seminar.pptx
+++ b/Präsentation/seminar.pptx
@@ -5,15 +5,26 @@
     <p:sldMasterId id="2147483663" r:id="rId1"/>
   </p:sldMasterIdLst>
   <p:notesMasterIdLst>
-    <p:notesMasterId r:id="rId5"/>
+    <p:notesMasterId r:id="rId16"/>
   </p:notesMasterIdLst>
   <p:handoutMasterIdLst>
-    <p:handoutMasterId r:id="rId6"/>
+    <p:handoutMasterId r:id="rId17"/>
   </p:handoutMasterIdLst>
   <p:sldIdLst>
     <p:sldId id="752" r:id="rId2"/>
     <p:sldId id="949" r:id="rId3"/>
     <p:sldId id="951" r:id="rId4"/>
+    <p:sldId id="952" r:id="rId5"/>
+    <p:sldId id="954" r:id="rId6"/>
+    <p:sldId id="955" r:id="rId7"/>
+    <p:sldId id="956" r:id="rId8"/>
+    <p:sldId id="957" r:id="rId9"/>
+    <p:sldId id="958" r:id="rId10"/>
+    <p:sldId id="959" r:id="rId11"/>
+    <p:sldId id="960" r:id="rId12"/>
+    <p:sldId id="961" r:id="rId13"/>
+    <p:sldId id="962" r:id="rId14"/>
+    <p:sldId id="953" r:id="rId15"/>
   </p:sldIdLst>
   <p:sldSz cx="9144000" cy="6858000" type="screen4x3"/>
   <p:notesSz cx="6858000" cy="9144000"/>
@@ -750,6 +761,185 @@
 </p:notes>
 </file>
 
+<file path=ppt/notesSlides/notesSlide10.xml><?xml version="1.0" encoding="utf-8"?>
+<p:notes xmlns:a="http://schemas.openxmlformats.org/drawingml/2006/main" xmlns:r="http://schemas.openxmlformats.org/officeDocument/2006/relationships" xmlns:p="http://schemas.openxmlformats.org/presentationml/2006/main">
+  <p:cSld>
+    <p:spTree>
+      <p:nvGrpSpPr>
+        <p:cNvPr id="1" name=""/>
+        <p:cNvGrpSpPr/>
+        <p:nvPr/>
+      </p:nvGrpSpPr>
+      <p:grpSpPr>
+        <a:xfrm>
+          <a:off x="0" y="0"/>
+          <a:ext cx="0" cy="0"/>
+          <a:chOff x="0" y="0"/>
+          <a:chExt cx="0" cy="0"/>
+        </a:xfrm>
+      </p:grpSpPr>
+      <p:sp>
+        <p:nvSpPr>
+          <p:cNvPr id="2" name="Folienbildplatzhalter 1"/>
+          <p:cNvSpPr>
+            <a:spLocks noGrp="1" noRot="1" noChangeAspect="1"/>
+          </p:cNvSpPr>
+          <p:nvPr>
+            <p:ph type="sldImg"/>
+          </p:nvPr>
+        </p:nvSpPr>
+        <p:spPr/>
+      </p:sp>
+      <p:sp>
+        <p:nvSpPr>
+          <p:cNvPr id="3" name="Notizenplatzhalter 2"/>
+          <p:cNvSpPr>
+            <a:spLocks noGrp="1"/>
+          </p:cNvSpPr>
+          <p:nvPr>
+            <p:ph type="body" idx="1"/>
+          </p:nvPr>
+        </p:nvSpPr>
+        <p:spPr/>
+        <p:txBody>
+          <a:bodyPr/>
+          <a:lstStyle/>
+          <a:p>
+            <a:endParaRPr lang="de-DE" dirty="0"/>
+          </a:p>
+        </p:txBody>
+      </p:sp>
+      <p:sp>
+        <p:nvSpPr>
+          <p:cNvPr id="4" name="Foliennummernplatzhalter 3"/>
+          <p:cNvSpPr>
+            <a:spLocks noGrp="1"/>
+          </p:cNvSpPr>
+          <p:nvPr>
+            <p:ph type="sldNum" sz="quarter" idx="10"/>
+          </p:nvPr>
+        </p:nvSpPr>
+        <p:spPr/>
+        <p:txBody>
+          <a:bodyPr/>
+          <a:lstStyle/>
+          <a:p>
+            <a:fld id="{781A4F79-E684-4978-8182-2DD3F95DEE42}" type="slidenum">
+              <a:rPr lang="en-US" smtClean="0"/>
+              <a:t>12</a:t>
+            </a:fld>
+            <a:endParaRPr lang="en-US"/>
+          </a:p>
+        </p:txBody>
+      </p:sp>
+    </p:spTree>
+    <p:extLst>
+      <p:ext uri="{BB962C8B-B14F-4D97-AF65-F5344CB8AC3E}">
+        <p14:creationId xmlns:p14="http://schemas.microsoft.com/office/powerpoint/2010/main" val="3715743030"/>
+      </p:ext>
+    </p:extLst>
+  </p:cSld>
+  <p:clrMapOvr>
+    <a:masterClrMapping/>
+  </p:clrMapOvr>
+</p:notes>
+</file>
+
+<file path=ppt/notesSlides/notesSlide11.xml><?xml version="1.0" encoding="utf-8"?>
+<p:notes xmlns:a="http://schemas.openxmlformats.org/drawingml/2006/main" xmlns:r="http://schemas.openxmlformats.org/officeDocument/2006/relationships" xmlns:p="http://schemas.openxmlformats.org/presentationml/2006/main">
+  <p:cSld>
+    <p:spTree>
+      <p:nvGrpSpPr>
+        <p:cNvPr id="1" name=""/>
+        <p:cNvGrpSpPr/>
+        <p:nvPr/>
+      </p:nvGrpSpPr>
+      <p:grpSpPr>
+        <a:xfrm>
+          <a:off x="0" y="0"/>
+          <a:ext cx="0" cy="0"/>
+          <a:chOff x="0" y="0"/>
+          <a:chExt cx="0" cy="0"/>
+        </a:xfrm>
+      </p:grpSpPr>
+      <p:sp>
+        <p:nvSpPr>
+          <p:cNvPr id="2" name="Folienbildplatzhalter 1"/>
+          <p:cNvSpPr>
+            <a:spLocks noGrp="1" noRot="1" noChangeAspect="1"/>
+          </p:cNvSpPr>
+          <p:nvPr>
+            <p:ph type="sldImg"/>
+          </p:nvPr>
+        </p:nvSpPr>
+        <p:spPr/>
+      </p:sp>
+      <p:sp>
+        <p:nvSpPr>
+          <p:cNvPr id="3" name="Notizenplatzhalter 2"/>
+          <p:cNvSpPr>
+            <a:spLocks noGrp="1"/>
+          </p:cNvSpPr>
+          <p:nvPr>
+            <p:ph type="body" idx="1"/>
+          </p:nvPr>
+        </p:nvSpPr>
+        <p:spPr/>
+        <p:txBody>
+          <a:bodyPr/>
+          <a:lstStyle/>
+          <a:p>
+            <a:r>
+              <a:rPr lang="de-DE" dirty="0"/>
+              <a:t>Beispielstruktur für Plan</a:t>
+            </a:r>
+            <a:endParaRPr lang="de-DE" baseline="0" dirty="0"/>
+          </a:p>
+          <a:p>
+            <a:r>
+              <a:rPr lang="de-DE" baseline="0" dirty="0"/>
+              <a:t>NICHT FÜR SOFTWARE ENTWICKLUNG ANGEPASST! (allgemein)</a:t>
+            </a:r>
+            <a:endParaRPr lang="de-DE" dirty="0"/>
+          </a:p>
+        </p:txBody>
+      </p:sp>
+      <p:sp>
+        <p:nvSpPr>
+          <p:cNvPr id="4" name="Foliennummernplatzhalter 3"/>
+          <p:cNvSpPr>
+            <a:spLocks noGrp="1"/>
+          </p:cNvSpPr>
+          <p:nvPr>
+            <p:ph type="sldNum" sz="quarter" idx="10"/>
+          </p:nvPr>
+        </p:nvSpPr>
+        <p:spPr/>
+        <p:txBody>
+          <a:bodyPr/>
+          <a:lstStyle/>
+          <a:p>
+            <a:fld id="{781A4F79-E684-4978-8182-2DD3F95DEE42}" type="slidenum">
+              <a:rPr lang="en-US" smtClean="0"/>
+              <a:t>13</a:t>
+            </a:fld>
+            <a:endParaRPr lang="en-US"/>
+          </a:p>
+        </p:txBody>
+      </p:sp>
+    </p:spTree>
+    <p:extLst>
+      <p:ext uri="{BB962C8B-B14F-4D97-AF65-F5344CB8AC3E}">
+        <p14:creationId xmlns:p14="http://schemas.microsoft.com/office/powerpoint/2010/main" val="1215260750"/>
+      </p:ext>
+    </p:extLst>
+  </p:cSld>
+  <p:clrMapOvr>
+    <a:masterClrMapping/>
+  </p:clrMapOvr>
+</p:notes>
+</file>
+
 <file path=ppt/notesSlides/notesSlide2.xml><?xml version="1.0" encoding="utf-8"?>
 <p:notes xmlns:a="http://schemas.openxmlformats.org/drawingml/2006/main" xmlns:r="http://schemas.openxmlformats.org/officeDocument/2006/relationships" xmlns:p="http://schemas.openxmlformats.org/presentationml/2006/main">
   <p:cSld>
@@ -796,8 +986,13 @@
           <a:p>
             <a:r>
               <a:rPr lang="de-DE" dirty="0"/>
-              <a:t>Konfigurationsmanagement im US-Militär entstanden</a:t>
-            </a:r>
+              <a:t>Bei</a:t>
+            </a:r>
+            <a:r>
+              <a:rPr lang="de-DE" baseline="0" dirty="0"/>
+              <a:t> jeder Änderung eines Erzeugnisses müssen auch die Dokumente geändert werden</a:t>
+            </a:r>
+            <a:endParaRPr lang="de-DE" dirty="0"/>
           </a:p>
         </p:txBody>
       </p:sp>
@@ -828,6 +1023,666 @@
     <p:extLst>
       <p:ext uri="{BB962C8B-B14F-4D97-AF65-F5344CB8AC3E}">
         <p14:creationId xmlns:p14="http://schemas.microsoft.com/office/powerpoint/2010/main" val="837069237"/>
+      </p:ext>
+    </p:extLst>
+  </p:cSld>
+  <p:clrMapOvr>
+    <a:masterClrMapping/>
+  </p:clrMapOvr>
+</p:notes>
+</file>
+
+<file path=ppt/notesSlides/notesSlide3.xml><?xml version="1.0" encoding="utf-8"?>
+<p:notes xmlns:a="http://schemas.openxmlformats.org/drawingml/2006/main" xmlns:r="http://schemas.openxmlformats.org/officeDocument/2006/relationships" xmlns:p="http://schemas.openxmlformats.org/presentationml/2006/main">
+  <p:cSld>
+    <p:spTree>
+      <p:nvGrpSpPr>
+        <p:cNvPr id="1" name=""/>
+        <p:cNvGrpSpPr/>
+        <p:nvPr/>
+      </p:nvGrpSpPr>
+      <p:grpSpPr>
+        <a:xfrm>
+          <a:off x="0" y="0"/>
+          <a:ext cx="0" cy="0"/>
+          <a:chOff x="0" y="0"/>
+          <a:chExt cx="0" cy="0"/>
+        </a:xfrm>
+      </p:grpSpPr>
+      <p:sp>
+        <p:nvSpPr>
+          <p:cNvPr id="2" name="Folienbildplatzhalter 1"/>
+          <p:cNvSpPr>
+            <a:spLocks noGrp="1" noRot="1" noChangeAspect="1"/>
+          </p:cNvSpPr>
+          <p:nvPr>
+            <p:ph type="sldImg"/>
+          </p:nvPr>
+        </p:nvSpPr>
+        <p:spPr/>
+      </p:sp>
+      <p:sp>
+        <p:nvSpPr>
+          <p:cNvPr id="3" name="Notizenplatzhalter 2"/>
+          <p:cNvSpPr>
+            <a:spLocks noGrp="1"/>
+          </p:cNvSpPr>
+          <p:nvPr>
+            <p:ph type="body" idx="1"/>
+          </p:nvPr>
+        </p:nvSpPr>
+        <p:spPr/>
+        <p:txBody>
+          <a:bodyPr/>
+          <a:lstStyle/>
+          <a:p>
+            <a:r>
+              <a:rPr lang="de-DE" dirty="0"/>
+              <a:t>Wie z. B. CMMI</a:t>
+            </a:r>
+            <a:r>
+              <a:rPr lang="de-DE" baseline="0" dirty="0"/>
+              <a:t> oder SPICE</a:t>
+            </a:r>
+          </a:p>
+          <a:p>
+            <a:r>
+              <a:rPr lang="de-DE" baseline="0" dirty="0" err="1"/>
+              <a:t>Vllt</a:t>
+            </a:r>
+            <a:r>
+              <a:rPr lang="de-DE" baseline="0" dirty="0"/>
+              <a:t> hier noch mehr darüber wie es in CMMI oder SPICE </a:t>
+            </a:r>
+            <a:r>
+              <a:rPr lang="de-DE" baseline="0" dirty="0" err="1"/>
+              <a:t>is</a:t>
+            </a:r>
+            <a:r>
+              <a:rPr lang="de-DE" baseline="0" dirty="0"/>
+              <a:t> falls ich mehr </a:t>
+            </a:r>
+            <a:r>
+              <a:rPr lang="de-DE" baseline="0" dirty="0" err="1"/>
+              <a:t>folien</a:t>
+            </a:r>
+            <a:r>
+              <a:rPr lang="de-DE" baseline="0"/>
+              <a:t> brauch</a:t>
+            </a:r>
+            <a:endParaRPr lang="de-DE" dirty="0"/>
+          </a:p>
+        </p:txBody>
+      </p:sp>
+      <p:sp>
+        <p:nvSpPr>
+          <p:cNvPr id="4" name="Foliennummernplatzhalter 3"/>
+          <p:cNvSpPr>
+            <a:spLocks noGrp="1"/>
+          </p:cNvSpPr>
+          <p:nvPr>
+            <p:ph type="sldNum" sz="quarter" idx="10"/>
+          </p:nvPr>
+        </p:nvSpPr>
+        <p:spPr/>
+        <p:txBody>
+          <a:bodyPr/>
+          <a:lstStyle/>
+          <a:p>
+            <a:fld id="{781A4F79-E684-4978-8182-2DD3F95DEE42}" type="slidenum">
+              <a:rPr lang="en-US" smtClean="0"/>
+              <a:t>4</a:t>
+            </a:fld>
+            <a:endParaRPr lang="en-US"/>
+          </a:p>
+        </p:txBody>
+      </p:sp>
+    </p:spTree>
+    <p:extLst>
+      <p:ext uri="{BB962C8B-B14F-4D97-AF65-F5344CB8AC3E}">
+        <p14:creationId xmlns:p14="http://schemas.microsoft.com/office/powerpoint/2010/main" val="532040415"/>
+      </p:ext>
+    </p:extLst>
+  </p:cSld>
+  <p:clrMapOvr>
+    <a:masterClrMapping/>
+  </p:clrMapOvr>
+</p:notes>
+</file>
+
+<file path=ppt/notesSlides/notesSlide4.xml><?xml version="1.0" encoding="utf-8"?>
+<p:notes xmlns:a="http://schemas.openxmlformats.org/drawingml/2006/main" xmlns:r="http://schemas.openxmlformats.org/officeDocument/2006/relationships" xmlns:p="http://schemas.openxmlformats.org/presentationml/2006/main">
+  <p:cSld>
+    <p:spTree>
+      <p:nvGrpSpPr>
+        <p:cNvPr id="1" name=""/>
+        <p:cNvGrpSpPr/>
+        <p:nvPr/>
+      </p:nvGrpSpPr>
+      <p:grpSpPr>
+        <a:xfrm>
+          <a:off x="0" y="0"/>
+          <a:ext cx="0" cy="0"/>
+          <a:chOff x="0" y="0"/>
+          <a:chExt cx="0" cy="0"/>
+        </a:xfrm>
+      </p:grpSpPr>
+      <p:sp>
+        <p:nvSpPr>
+          <p:cNvPr id="2" name="Folienbildplatzhalter 1"/>
+          <p:cNvSpPr>
+            <a:spLocks noGrp="1" noRot="1" noChangeAspect="1"/>
+          </p:cNvSpPr>
+          <p:nvPr>
+            <p:ph type="sldImg"/>
+          </p:nvPr>
+        </p:nvSpPr>
+        <p:spPr/>
+      </p:sp>
+      <p:sp>
+        <p:nvSpPr>
+          <p:cNvPr id="3" name="Notizenplatzhalter 2"/>
+          <p:cNvSpPr>
+            <a:spLocks noGrp="1"/>
+          </p:cNvSpPr>
+          <p:nvPr>
+            <p:ph type="body" idx="1"/>
+          </p:nvPr>
+        </p:nvSpPr>
+        <p:spPr/>
+        <p:txBody>
+          <a:bodyPr/>
+          <a:lstStyle/>
+          <a:p>
+            <a:r>
+              <a:rPr lang="de-DE" dirty="0"/>
+              <a:t>Noch allgemein -&gt; nicht explizit</a:t>
+            </a:r>
+            <a:r>
+              <a:rPr lang="de-DE" baseline="0" dirty="0"/>
+              <a:t> für Softwareentwicklung</a:t>
+            </a:r>
+            <a:endParaRPr lang="de-DE" dirty="0"/>
+          </a:p>
+        </p:txBody>
+      </p:sp>
+      <p:sp>
+        <p:nvSpPr>
+          <p:cNvPr id="4" name="Foliennummernplatzhalter 3"/>
+          <p:cNvSpPr>
+            <a:spLocks noGrp="1"/>
+          </p:cNvSpPr>
+          <p:nvPr>
+            <p:ph type="sldNum" sz="quarter" idx="10"/>
+          </p:nvPr>
+        </p:nvSpPr>
+        <p:spPr/>
+        <p:txBody>
+          <a:bodyPr/>
+          <a:lstStyle/>
+          <a:p>
+            <a:fld id="{781A4F79-E684-4978-8182-2DD3F95DEE42}" type="slidenum">
+              <a:rPr lang="en-US" smtClean="0"/>
+              <a:t>5</a:t>
+            </a:fld>
+            <a:endParaRPr lang="en-US"/>
+          </a:p>
+        </p:txBody>
+      </p:sp>
+    </p:spTree>
+    <p:extLst>
+      <p:ext uri="{BB962C8B-B14F-4D97-AF65-F5344CB8AC3E}">
+        <p14:creationId xmlns:p14="http://schemas.microsoft.com/office/powerpoint/2010/main" val="477646574"/>
+      </p:ext>
+    </p:extLst>
+  </p:cSld>
+  <p:clrMapOvr>
+    <a:masterClrMapping/>
+  </p:clrMapOvr>
+</p:notes>
+</file>
+
+<file path=ppt/notesSlides/notesSlide5.xml><?xml version="1.0" encoding="utf-8"?>
+<p:notes xmlns:a="http://schemas.openxmlformats.org/drawingml/2006/main" xmlns:r="http://schemas.openxmlformats.org/officeDocument/2006/relationships" xmlns:p="http://schemas.openxmlformats.org/presentationml/2006/main">
+  <p:cSld>
+    <p:spTree>
+      <p:nvGrpSpPr>
+        <p:cNvPr id="1" name=""/>
+        <p:cNvGrpSpPr/>
+        <p:nvPr/>
+      </p:nvGrpSpPr>
+      <p:grpSpPr>
+        <a:xfrm>
+          <a:off x="0" y="0"/>
+          <a:ext cx="0" cy="0"/>
+          <a:chOff x="0" y="0"/>
+          <a:chExt cx="0" cy="0"/>
+        </a:xfrm>
+      </p:grpSpPr>
+      <p:sp>
+        <p:nvSpPr>
+          <p:cNvPr id="2" name="Folienbildplatzhalter 1"/>
+          <p:cNvSpPr>
+            <a:spLocks noGrp="1" noRot="1" noChangeAspect="1"/>
+          </p:cNvSpPr>
+          <p:nvPr>
+            <p:ph type="sldImg"/>
+          </p:nvPr>
+        </p:nvSpPr>
+        <p:spPr/>
+      </p:sp>
+      <p:sp>
+        <p:nvSpPr>
+          <p:cNvPr id="3" name="Notizenplatzhalter 2"/>
+          <p:cNvSpPr>
+            <a:spLocks noGrp="1"/>
+          </p:cNvSpPr>
+          <p:nvPr>
+            <p:ph type="body" idx="1"/>
+          </p:nvPr>
+        </p:nvSpPr>
+        <p:spPr/>
+        <p:txBody>
+          <a:bodyPr/>
+          <a:lstStyle/>
+          <a:p>
+            <a:r>
+              <a:rPr lang="de-DE" dirty="0"/>
+              <a:t>- Artefakte</a:t>
+            </a:r>
+            <a:r>
+              <a:rPr lang="de-DE" baseline="0" dirty="0"/>
+              <a:t> wie z. B. Konfigurationseinheiten(Code), Dokumente, Schnittstellen, Änderungen</a:t>
+            </a:r>
+          </a:p>
+          <a:p>
+            <a:r>
+              <a:rPr lang="de-DE" dirty="0"/>
+              <a:t>- Bezugskonfigurationen: die + ihre Änderungen sind als aktuell gültige Konfigurationen zu verstehen</a:t>
+            </a:r>
+          </a:p>
+        </p:txBody>
+      </p:sp>
+      <p:sp>
+        <p:nvSpPr>
+          <p:cNvPr id="4" name="Foliennummernplatzhalter 3"/>
+          <p:cNvSpPr>
+            <a:spLocks noGrp="1"/>
+          </p:cNvSpPr>
+          <p:nvPr>
+            <p:ph type="sldNum" sz="quarter" idx="10"/>
+          </p:nvPr>
+        </p:nvSpPr>
+        <p:spPr/>
+        <p:txBody>
+          <a:bodyPr/>
+          <a:lstStyle/>
+          <a:p>
+            <a:fld id="{781A4F79-E684-4978-8182-2DD3F95DEE42}" type="slidenum">
+              <a:rPr lang="en-US" smtClean="0"/>
+              <a:t>7</a:t>
+            </a:fld>
+            <a:endParaRPr lang="en-US"/>
+          </a:p>
+        </p:txBody>
+      </p:sp>
+    </p:spTree>
+    <p:extLst>
+      <p:ext uri="{BB962C8B-B14F-4D97-AF65-F5344CB8AC3E}">
+        <p14:creationId xmlns:p14="http://schemas.microsoft.com/office/powerpoint/2010/main" val="3323002305"/>
+      </p:ext>
+    </p:extLst>
+  </p:cSld>
+  <p:clrMapOvr>
+    <a:masterClrMapping/>
+  </p:clrMapOvr>
+</p:notes>
+</file>
+
+<file path=ppt/notesSlides/notesSlide6.xml><?xml version="1.0" encoding="utf-8"?>
+<p:notes xmlns:a="http://schemas.openxmlformats.org/drawingml/2006/main" xmlns:r="http://schemas.openxmlformats.org/officeDocument/2006/relationships" xmlns:p="http://schemas.openxmlformats.org/presentationml/2006/main">
+  <p:cSld>
+    <p:spTree>
+      <p:nvGrpSpPr>
+        <p:cNvPr id="1" name=""/>
+        <p:cNvGrpSpPr/>
+        <p:nvPr/>
+      </p:nvGrpSpPr>
+      <p:grpSpPr>
+        <a:xfrm>
+          <a:off x="0" y="0"/>
+          <a:ext cx="0" cy="0"/>
+          <a:chOff x="0" y="0"/>
+          <a:chExt cx="0" cy="0"/>
+        </a:xfrm>
+      </p:grpSpPr>
+      <p:sp>
+        <p:nvSpPr>
+          <p:cNvPr id="2" name="Folienbildplatzhalter 1"/>
+          <p:cNvSpPr>
+            <a:spLocks noGrp="1" noRot="1" noChangeAspect="1"/>
+          </p:cNvSpPr>
+          <p:nvPr>
+            <p:ph type="sldImg"/>
+          </p:nvPr>
+        </p:nvSpPr>
+        <p:spPr/>
+      </p:sp>
+      <p:sp>
+        <p:nvSpPr>
+          <p:cNvPr id="3" name="Notizenplatzhalter 2"/>
+          <p:cNvSpPr>
+            <a:spLocks noGrp="1"/>
+          </p:cNvSpPr>
+          <p:nvPr>
+            <p:ph type="body" idx="1"/>
+          </p:nvPr>
+        </p:nvSpPr>
+        <p:spPr/>
+        <p:txBody>
+          <a:bodyPr/>
+          <a:lstStyle/>
+          <a:p>
+            <a:endParaRPr lang="de-DE" dirty="0"/>
+          </a:p>
+        </p:txBody>
+      </p:sp>
+      <p:sp>
+        <p:nvSpPr>
+          <p:cNvPr id="4" name="Foliennummernplatzhalter 3"/>
+          <p:cNvSpPr>
+            <a:spLocks noGrp="1"/>
+          </p:cNvSpPr>
+          <p:nvPr>
+            <p:ph type="sldNum" sz="quarter" idx="10"/>
+          </p:nvPr>
+        </p:nvSpPr>
+        <p:spPr/>
+        <p:txBody>
+          <a:bodyPr/>
+          <a:lstStyle/>
+          <a:p>
+            <a:fld id="{781A4F79-E684-4978-8182-2DD3F95DEE42}" type="slidenum">
+              <a:rPr lang="en-US" smtClean="0"/>
+              <a:t>8</a:t>
+            </a:fld>
+            <a:endParaRPr lang="en-US"/>
+          </a:p>
+        </p:txBody>
+      </p:sp>
+    </p:spTree>
+    <p:extLst>
+      <p:ext uri="{BB962C8B-B14F-4D97-AF65-F5344CB8AC3E}">
+        <p14:creationId xmlns:p14="http://schemas.microsoft.com/office/powerpoint/2010/main" val="700859320"/>
+      </p:ext>
+    </p:extLst>
+  </p:cSld>
+  <p:clrMapOvr>
+    <a:masterClrMapping/>
+  </p:clrMapOvr>
+</p:notes>
+</file>
+
+<file path=ppt/notesSlides/notesSlide7.xml><?xml version="1.0" encoding="utf-8"?>
+<p:notes xmlns:a="http://schemas.openxmlformats.org/drawingml/2006/main" xmlns:r="http://schemas.openxmlformats.org/officeDocument/2006/relationships" xmlns:p="http://schemas.openxmlformats.org/presentationml/2006/main">
+  <p:cSld>
+    <p:spTree>
+      <p:nvGrpSpPr>
+        <p:cNvPr id="1" name=""/>
+        <p:cNvGrpSpPr/>
+        <p:nvPr/>
+      </p:nvGrpSpPr>
+      <p:grpSpPr>
+        <a:xfrm>
+          <a:off x="0" y="0"/>
+          <a:ext cx="0" cy="0"/>
+          <a:chOff x="0" y="0"/>
+          <a:chExt cx="0" cy="0"/>
+        </a:xfrm>
+      </p:grpSpPr>
+      <p:sp>
+        <p:nvSpPr>
+          <p:cNvPr id="2" name="Folienbildplatzhalter 1"/>
+          <p:cNvSpPr>
+            <a:spLocks noGrp="1" noRot="1" noChangeAspect="1"/>
+          </p:cNvSpPr>
+          <p:nvPr>
+            <p:ph type="sldImg"/>
+          </p:nvPr>
+        </p:nvSpPr>
+        <p:spPr/>
+      </p:sp>
+      <p:sp>
+        <p:nvSpPr>
+          <p:cNvPr id="3" name="Notizenplatzhalter 2"/>
+          <p:cNvSpPr>
+            <a:spLocks noGrp="1"/>
+          </p:cNvSpPr>
+          <p:nvPr>
+            <p:ph type="body" idx="1"/>
+          </p:nvPr>
+        </p:nvSpPr>
+        <p:spPr/>
+        <p:txBody>
+          <a:bodyPr/>
+          <a:lstStyle/>
+          <a:p>
+            <a:r>
+              <a:rPr lang="de-DE" dirty="0"/>
+              <a:t>Bezugskonfigurationen aus </a:t>
+            </a:r>
+            <a:r>
+              <a:rPr lang="de-DE" dirty="0" err="1"/>
+              <a:t>identifizierung</a:t>
+            </a:r>
+            <a:endParaRPr lang="de-DE" dirty="0"/>
+          </a:p>
+          <a:p>
+            <a:r>
+              <a:rPr lang="de-DE" dirty="0"/>
+              <a:t>Dokumentation von Änderungen aus Überwachung</a:t>
+            </a:r>
+          </a:p>
+        </p:txBody>
+      </p:sp>
+      <p:sp>
+        <p:nvSpPr>
+          <p:cNvPr id="4" name="Foliennummernplatzhalter 3"/>
+          <p:cNvSpPr>
+            <a:spLocks noGrp="1"/>
+          </p:cNvSpPr>
+          <p:nvPr>
+            <p:ph type="sldNum" sz="quarter" idx="10"/>
+          </p:nvPr>
+        </p:nvSpPr>
+        <p:spPr/>
+        <p:txBody>
+          <a:bodyPr/>
+          <a:lstStyle/>
+          <a:p>
+            <a:fld id="{781A4F79-E684-4978-8182-2DD3F95DEE42}" type="slidenum">
+              <a:rPr lang="en-US" smtClean="0"/>
+              <a:t>9</a:t>
+            </a:fld>
+            <a:endParaRPr lang="en-US"/>
+          </a:p>
+        </p:txBody>
+      </p:sp>
+    </p:spTree>
+    <p:extLst>
+      <p:ext uri="{BB962C8B-B14F-4D97-AF65-F5344CB8AC3E}">
+        <p14:creationId xmlns:p14="http://schemas.microsoft.com/office/powerpoint/2010/main" val="1984105130"/>
+      </p:ext>
+    </p:extLst>
+  </p:cSld>
+  <p:clrMapOvr>
+    <a:masterClrMapping/>
+  </p:clrMapOvr>
+</p:notes>
+</file>
+
+<file path=ppt/notesSlides/notesSlide8.xml><?xml version="1.0" encoding="utf-8"?>
+<p:notes xmlns:a="http://schemas.openxmlformats.org/drawingml/2006/main" xmlns:r="http://schemas.openxmlformats.org/officeDocument/2006/relationships" xmlns:p="http://schemas.openxmlformats.org/presentationml/2006/main">
+  <p:cSld>
+    <p:spTree>
+      <p:nvGrpSpPr>
+        <p:cNvPr id="1" name=""/>
+        <p:cNvGrpSpPr/>
+        <p:nvPr/>
+      </p:nvGrpSpPr>
+      <p:grpSpPr>
+        <a:xfrm>
+          <a:off x="0" y="0"/>
+          <a:ext cx="0" cy="0"/>
+          <a:chOff x="0" y="0"/>
+          <a:chExt cx="0" cy="0"/>
+        </a:xfrm>
+      </p:grpSpPr>
+      <p:sp>
+        <p:nvSpPr>
+          <p:cNvPr id="2" name="Folienbildplatzhalter 1"/>
+          <p:cNvSpPr>
+            <a:spLocks noGrp="1" noRot="1" noChangeAspect="1"/>
+          </p:cNvSpPr>
+          <p:nvPr>
+            <p:ph type="sldImg"/>
+          </p:nvPr>
+        </p:nvSpPr>
+        <p:spPr/>
+      </p:sp>
+      <p:sp>
+        <p:nvSpPr>
+          <p:cNvPr id="3" name="Notizenplatzhalter 2"/>
+          <p:cNvSpPr>
+            <a:spLocks noGrp="1"/>
+          </p:cNvSpPr>
+          <p:nvPr>
+            <p:ph type="body" idx="1"/>
+          </p:nvPr>
+        </p:nvSpPr>
+        <p:spPr/>
+        <p:txBody>
+          <a:bodyPr/>
+          <a:lstStyle/>
+          <a:p>
+            <a:endParaRPr lang="de-DE" dirty="0"/>
+          </a:p>
+        </p:txBody>
+      </p:sp>
+      <p:sp>
+        <p:nvSpPr>
+          <p:cNvPr id="4" name="Foliennummernplatzhalter 3"/>
+          <p:cNvSpPr>
+            <a:spLocks noGrp="1"/>
+          </p:cNvSpPr>
+          <p:nvPr>
+            <p:ph type="sldNum" sz="quarter" idx="10"/>
+          </p:nvPr>
+        </p:nvSpPr>
+        <p:spPr/>
+        <p:txBody>
+          <a:bodyPr/>
+          <a:lstStyle/>
+          <a:p>
+            <a:fld id="{781A4F79-E684-4978-8182-2DD3F95DEE42}" type="slidenum">
+              <a:rPr lang="en-US" smtClean="0"/>
+              <a:t>10</a:t>
+            </a:fld>
+            <a:endParaRPr lang="en-US"/>
+          </a:p>
+        </p:txBody>
+      </p:sp>
+    </p:spTree>
+    <p:extLst>
+      <p:ext uri="{BB962C8B-B14F-4D97-AF65-F5344CB8AC3E}">
+        <p14:creationId xmlns:p14="http://schemas.microsoft.com/office/powerpoint/2010/main" val="3986986863"/>
+      </p:ext>
+    </p:extLst>
+  </p:cSld>
+  <p:clrMapOvr>
+    <a:masterClrMapping/>
+  </p:clrMapOvr>
+</p:notes>
+</file>
+
+<file path=ppt/notesSlides/notesSlide9.xml><?xml version="1.0" encoding="utf-8"?>
+<p:notes xmlns:a="http://schemas.openxmlformats.org/drawingml/2006/main" xmlns:r="http://schemas.openxmlformats.org/officeDocument/2006/relationships" xmlns:p="http://schemas.openxmlformats.org/presentationml/2006/main">
+  <p:cSld>
+    <p:spTree>
+      <p:nvGrpSpPr>
+        <p:cNvPr id="1" name=""/>
+        <p:cNvGrpSpPr/>
+        <p:nvPr/>
+      </p:nvGrpSpPr>
+      <p:grpSpPr>
+        <a:xfrm>
+          <a:off x="0" y="0"/>
+          <a:ext cx="0" cy="0"/>
+          <a:chOff x="0" y="0"/>
+          <a:chExt cx="0" cy="0"/>
+        </a:xfrm>
+      </p:grpSpPr>
+      <p:sp>
+        <p:nvSpPr>
+          <p:cNvPr id="2" name="Folienbildplatzhalter 1"/>
+          <p:cNvSpPr>
+            <a:spLocks noGrp="1" noRot="1" noChangeAspect="1"/>
+          </p:cNvSpPr>
+          <p:nvPr>
+            <p:ph type="sldImg"/>
+          </p:nvPr>
+        </p:nvSpPr>
+        <p:spPr/>
+      </p:sp>
+      <p:sp>
+        <p:nvSpPr>
+          <p:cNvPr id="3" name="Notizenplatzhalter 2"/>
+          <p:cNvSpPr>
+            <a:spLocks noGrp="1"/>
+          </p:cNvSpPr>
+          <p:nvPr>
+            <p:ph type="body" idx="1"/>
+          </p:nvPr>
+        </p:nvSpPr>
+        <p:spPr/>
+        <p:txBody>
+          <a:bodyPr/>
+          <a:lstStyle/>
+          <a:p>
+            <a:r>
+              <a:rPr lang="de-DE" dirty="0"/>
+              <a:t>Sonst passt laut Dokumentation alles aber das Erzeugnis ist eigentlich ganz anders</a:t>
+            </a:r>
+          </a:p>
+        </p:txBody>
+      </p:sp>
+      <p:sp>
+        <p:nvSpPr>
+          <p:cNvPr id="4" name="Foliennummernplatzhalter 3"/>
+          <p:cNvSpPr>
+            <a:spLocks noGrp="1"/>
+          </p:cNvSpPr>
+          <p:nvPr>
+            <p:ph type="sldNum" sz="quarter" idx="10"/>
+          </p:nvPr>
+        </p:nvSpPr>
+        <p:spPr/>
+        <p:txBody>
+          <a:bodyPr/>
+          <a:lstStyle/>
+          <a:p>
+            <a:fld id="{781A4F79-E684-4978-8182-2DD3F95DEE42}" type="slidenum">
+              <a:rPr lang="en-US" smtClean="0"/>
+              <a:t>11</a:t>
+            </a:fld>
+            <a:endParaRPr lang="en-US"/>
+          </a:p>
+        </p:txBody>
+      </p:sp>
+    </p:spTree>
+    <p:extLst>
+      <p:ext uri="{BB962C8B-B14F-4D97-AF65-F5344CB8AC3E}">
+        <p14:creationId xmlns:p14="http://schemas.microsoft.com/office/powerpoint/2010/main" val="1406352598"/>
       </p:ext>
     </p:extLst>
   </p:cSld>
@@ -5694,6 +6549,723 @@
 </p:sld>
 </file>
 
+<file path=ppt/slides/slide10.xml><?xml version="1.0" encoding="utf-8"?>
+<p:sld xmlns:a="http://schemas.openxmlformats.org/drawingml/2006/main" xmlns:r="http://schemas.openxmlformats.org/officeDocument/2006/relationships" xmlns:p="http://schemas.openxmlformats.org/presentationml/2006/main">
+  <p:cSld>
+    <p:spTree>
+      <p:nvGrpSpPr>
+        <p:cNvPr id="1" name=""/>
+        <p:cNvGrpSpPr/>
+        <p:nvPr/>
+      </p:nvGrpSpPr>
+      <p:grpSpPr>
+        <a:xfrm>
+          <a:off x="0" y="0"/>
+          <a:ext cx="0" cy="0"/>
+          <a:chOff x="0" y="0"/>
+          <a:chExt cx="0" cy="0"/>
+        </a:xfrm>
+      </p:grpSpPr>
+      <p:sp>
+        <p:nvSpPr>
+          <p:cNvPr id="2" name="Titel 1"/>
+          <p:cNvSpPr>
+            <a:spLocks noGrp="1"/>
+          </p:cNvSpPr>
+          <p:nvPr>
+            <p:ph type="title"/>
+          </p:nvPr>
+        </p:nvSpPr>
+        <p:spPr/>
+        <p:txBody>
+          <a:bodyPr/>
+          <a:lstStyle/>
+          <a:p>
+            <a:r>
+              <a:rPr lang="de-DE" dirty="0" err="1"/>
+              <a:t>Konfigurationsauditierung</a:t>
+            </a:r>
+            <a:endParaRPr lang="de-DE" dirty="0"/>
+          </a:p>
+        </p:txBody>
+      </p:sp>
+      <p:sp>
+        <p:nvSpPr>
+          <p:cNvPr id="3" name="Inhaltsplatzhalter 2"/>
+          <p:cNvSpPr>
+            <a:spLocks noGrp="1"/>
+          </p:cNvSpPr>
+          <p:nvPr>
+            <p:ph idx="1"/>
+          </p:nvPr>
+        </p:nvSpPr>
+        <p:spPr/>
+        <p:txBody>
+          <a:bodyPr/>
+          <a:lstStyle/>
+          <a:p>
+            <a:pPr marL="0" indent="0">
+              <a:buNone/>
+            </a:pPr>
+            <a:r>
+              <a:rPr lang="de-DE" dirty="0" err="1"/>
+              <a:t>Konfigurationsauditierung</a:t>
+            </a:r>
+            <a:r>
+              <a:rPr lang="de-DE" dirty="0"/>
+              <a:t> lässt sich in zwei Tätigkeiten aufteilen:</a:t>
+            </a:r>
+          </a:p>
+          <a:p>
+            <a:pPr marL="0" indent="0">
+              <a:buNone/>
+            </a:pPr>
+            <a:endParaRPr lang="de-DE" dirty="0"/>
+          </a:p>
+          <a:p>
+            <a:pPr marL="457200" indent="-457200">
+              <a:buFont typeface="+mj-lt"/>
+              <a:buAutoNum type="arabicPeriod"/>
+            </a:pPr>
+            <a:r>
+              <a:rPr lang="de-DE" dirty="0"/>
+              <a:t>Funktionsbezogene Konfigurationsaudit:</a:t>
+            </a:r>
+          </a:p>
+          <a:p>
+            <a:pPr lvl="1"/>
+            <a:r>
+              <a:rPr lang="de-DE" dirty="0"/>
+              <a:t>Gewährleistet, dass das Erzeugnis den vertraglich spezifizierten Anforderungen entspricht</a:t>
+            </a:r>
+          </a:p>
+          <a:p>
+            <a:pPr lvl="1"/>
+            <a:r>
+              <a:rPr lang="de-DE" dirty="0"/>
+              <a:t>Eine Konfigurationseinheit muss alle Leistungen und funktionellen Merkmale erreichen, die zuvor in den Konfigurationsdokumenten festgelegt wurden</a:t>
+            </a:r>
+          </a:p>
+        </p:txBody>
+      </p:sp>
+      <p:sp>
+        <p:nvSpPr>
+          <p:cNvPr id="4" name="Foliennummernplatzhalter 3"/>
+          <p:cNvSpPr>
+            <a:spLocks noGrp="1"/>
+          </p:cNvSpPr>
+          <p:nvPr>
+            <p:ph type="sldNum" sz="quarter" idx="12"/>
+          </p:nvPr>
+        </p:nvSpPr>
+        <p:spPr/>
+        <p:txBody>
+          <a:bodyPr/>
+          <a:lstStyle/>
+          <a:p>
+            <a:fld id="{5C476CE9-DBD6-47B2-9488-80AA33A3CE56}" type="slidenum">
+              <a:rPr lang="en-US" smtClean="0"/>
+              <a:pPr/>
+              <a:t>10</a:t>
+            </a:fld>
+            <a:endParaRPr lang="en-US" dirty="0"/>
+          </a:p>
+        </p:txBody>
+      </p:sp>
+      <p:pic>
+        <p:nvPicPr>
+          <p:cNvPr id="3074" name="Picture 2" descr="http://www.tvidesigns.com/v4/wp-content/uploads/2015/11/audit2.jpg"/>
+          <p:cNvPicPr>
+            <a:picLocks noChangeAspect="1" noChangeArrowheads="1"/>
+          </p:cNvPicPr>
+          <p:nvPr/>
+        </p:nvPicPr>
+        <p:blipFill>
+          <a:blip r:embed="rId3">
+            <a:extLst>
+              <a:ext uri="{28A0092B-C50C-407E-A947-70E740481C1C}">
+                <a14:useLocalDpi xmlns:a14="http://schemas.microsoft.com/office/drawing/2010/main" val="0"/>
+              </a:ext>
+            </a:extLst>
+          </a:blip>
+          <a:srcRect/>
+          <a:stretch>
+            <a:fillRect/>
+          </a:stretch>
+        </p:blipFill>
+        <p:spPr bwMode="auto">
+          <a:xfrm>
+            <a:off x="5840350" y="4386763"/>
+            <a:ext cx="2675000" cy="1785437"/>
+          </a:xfrm>
+          <a:prstGeom prst="rect">
+            <a:avLst/>
+          </a:prstGeom>
+          <a:noFill/>
+          <a:extLst>
+            <a:ext uri="{909E8E84-426E-40DD-AFC4-6F175D3DCCD1}">
+              <a14:hiddenFill xmlns:a14="http://schemas.microsoft.com/office/drawing/2010/main">
+                <a:solidFill>
+                  <a:srgbClr val="FFFFFF"/>
+                </a:solidFill>
+              </a14:hiddenFill>
+            </a:ext>
+          </a:extLst>
+        </p:spPr>
+      </p:pic>
+    </p:spTree>
+    <p:extLst>
+      <p:ext uri="{BB962C8B-B14F-4D97-AF65-F5344CB8AC3E}">
+        <p14:creationId xmlns:p14="http://schemas.microsoft.com/office/powerpoint/2010/main" val="2280941312"/>
+      </p:ext>
+    </p:extLst>
+  </p:cSld>
+  <p:clrMapOvr>
+    <a:masterClrMapping/>
+  </p:clrMapOvr>
+</p:sld>
+</file>
+
+<file path=ppt/slides/slide11.xml><?xml version="1.0" encoding="utf-8"?>
+<p:sld xmlns:a="http://schemas.openxmlformats.org/drawingml/2006/main" xmlns:r="http://schemas.openxmlformats.org/officeDocument/2006/relationships" xmlns:p="http://schemas.openxmlformats.org/presentationml/2006/main">
+  <p:cSld>
+    <p:spTree>
+      <p:nvGrpSpPr>
+        <p:cNvPr id="1" name=""/>
+        <p:cNvGrpSpPr/>
+        <p:nvPr/>
+      </p:nvGrpSpPr>
+      <p:grpSpPr>
+        <a:xfrm>
+          <a:off x="0" y="0"/>
+          <a:ext cx="0" cy="0"/>
+          <a:chOff x="0" y="0"/>
+          <a:chExt cx="0" cy="0"/>
+        </a:xfrm>
+      </p:grpSpPr>
+      <p:sp>
+        <p:nvSpPr>
+          <p:cNvPr id="2" name="Titel 1"/>
+          <p:cNvSpPr>
+            <a:spLocks noGrp="1"/>
+          </p:cNvSpPr>
+          <p:nvPr>
+            <p:ph type="title"/>
+          </p:nvPr>
+        </p:nvSpPr>
+        <p:spPr/>
+        <p:txBody>
+          <a:bodyPr/>
+          <a:lstStyle/>
+          <a:p>
+            <a:r>
+              <a:rPr lang="de-DE" dirty="0" err="1"/>
+              <a:t>Konfigurationsauditierung</a:t>
+            </a:r>
+            <a:endParaRPr lang="de-DE" dirty="0"/>
+          </a:p>
+        </p:txBody>
+      </p:sp>
+      <p:sp>
+        <p:nvSpPr>
+          <p:cNvPr id="3" name="Inhaltsplatzhalter 2"/>
+          <p:cNvSpPr>
+            <a:spLocks noGrp="1"/>
+          </p:cNvSpPr>
+          <p:nvPr>
+            <p:ph idx="1"/>
+          </p:nvPr>
+        </p:nvSpPr>
+        <p:spPr/>
+        <p:txBody>
+          <a:bodyPr/>
+          <a:lstStyle/>
+          <a:p>
+            <a:pPr marL="0" indent="0">
+              <a:buNone/>
+            </a:pPr>
+            <a:r>
+              <a:rPr lang="de-DE" dirty="0" err="1"/>
+              <a:t>Konfigurationsauditierung</a:t>
+            </a:r>
+            <a:r>
+              <a:rPr lang="de-DE" dirty="0"/>
+              <a:t> lässt sich in zwei Tätigkeiten aufteilen:</a:t>
+            </a:r>
+          </a:p>
+          <a:p>
+            <a:pPr marL="0" indent="0">
+              <a:buNone/>
+            </a:pPr>
+            <a:endParaRPr lang="de-DE" dirty="0"/>
+          </a:p>
+          <a:p>
+            <a:pPr marL="0" indent="0">
+              <a:buNone/>
+            </a:pPr>
+            <a:r>
+              <a:rPr lang="de-DE" dirty="0"/>
+              <a:t>2.    Physische Konfigurationsaudit:</a:t>
+            </a:r>
+          </a:p>
+          <a:p>
+            <a:pPr lvl="1"/>
+            <a:r>
+              <a:rPr lang="de-DE" dirty="0"/>
+              <a:t>Prüft, ob eine aktuelle Konfiguration einer Konfigurationseinheit mit den Konfigurationsdokumenten übereinstimmt</a:t>
+            </a:r>
+          </a:p>
+          <a:p>
+            <a:pPr lvl="1"/>
+            <a:r>
+              <a:rPr lang="de-DE" dirty="0"/>
+              <a:t>Stellt sicher, dass Dokumente und Erzeugnisse nicht voneinander abweichen</a:t>
+            </a:r>
+          </a:p>
+        </p:txBody>
+      </p:sp>
+      <p:sp>
+        <p:nvSpPr>
+          <p:cNvPr id="4" name="Foliennummernplatzhalter 3"/>
+          <p:cNvSpPr>
+            <a:spLocks noGrp="1"/>
+          </p:cNvSpPr>
+          <p:nvPr>
+            <p:ph type="sldNum" sz="quarter" idx="12"/>
+          </p:nvPr>
+        </p:nvSpPr>
+        <p:spPr/>
+        <p:txBody>
+          <a:bodyPr/>
+          <a:lstStyle/>
+          <a:p>
+            <a:fld id="{5C476CE9-DBD6-47B2-9488-80AA33A3CE56}" type="slidenum">
+              <a:rPr lang="en-US" smtClean="0"/>
+              <a:pPr/>
+              <a:t>11</a:t>
+            </a:fld>
+            <a:endParaRPr lang="en-US" dirty="0"/>
+          </a:p>
+        </p:txBody>
+      </p:sp>
+      <p:pic>
+        <p:nvPicPr>
+          <p:cNvPr id="3074" name="Picture 2" descr="http://www.tvidesigns.com/v4/wp-content/uploads/2015/11/audit2.jpg"/>
+          <p:cNvPicPr>
+            <a:picLocks noChangeAspect="1" noChangeArrowheads="1"/>
+          </p:cNvPicPr>
+          <p:nvPr/>
+        </p:nvPicPr>
+        <p:blipFill>
+          <a:blip r:embed="rId3">
+            <a:extLst>
+              <a:ext uri="{28A0092B-C50C-407E-A947-70E740481C1C}">
+                <a14:useLocalDpi xmlns:a14="http://schemas.microsoft.com/office/drawing/2010/main" val="0"/>
+              </a:ext>
+            </a:extLst>
+          </a:blip>
+          <a:srcRect/>
+          <a:stretch>
+            <a:fillRect/>
+          </a:stretch>
+        </p:blipFill>
+        <p:spPr bwMode="auto">
+          <a:xfrm>
+            <a:off x="5840350" y="4386763"/>
+            <a:ext cx="2675000" cy="1785437"/>
+          </a:xfrm>
+          <a:prstGeom prst="rect">
+            <a:avLst/>
+          </a:prstGeom>
+          <a:noFill/>
+          <a:extLst>
+            <a:ext uri="{909E8E84-426E-40DD-AFC4-6F175D3DCCD1}">
+              <a14:hiddenFill xmlns:a14="http://schemas.microsoft.com/office/drawing/2010/main">
+                <a:solidFill>
+                  <a:srgbClr val="FFFFFF"/>
+                </a:solidFill>
+              </a14:hiddenFill>
+            </a:ext>
+          </a:extLst>
+        </p:spPr>
+      </p:pic>
+    </p:spTree>
+    <p:extLst>
+      <p:ext uri="{BB962C8B-B14F-4D97-AF65-F5344CB8AC3E}">
+        <p14:creationId xmlns:p14="http://schemas.microsoft.com/office/powerpoint/2010/main" val="2717857140"/>
+      </p:ext>
+    </p:extLst>
+  </p:cSld>
+  <p:clrMapOvr>
+    <a:masterClrMapping/>
+  </p:clrMapOvr>
+</p:sld>
+</file>
+
+<file path=ppt/slides/slide12.xml><?xml version="1.0" encoding="utf-8"?>
+<p:sld xmlns:a="http://schemas.openxmlformats.org/drawingml/2006/main" xmlns:r="http://schemas.openxmlformats.org/officeDocument/2006/relationships" xmlns:p="http://schemas.openxmlformats.org/presentationml/2006/main">
+  <p:cSld>
+    <p:spTree>
+      <p:nvGrpSpPr>
+        <p:cNvPr id="1" name=""/>
+        <p:cNvGrpSpPr/>
+        <p:nvPr/>
+      </p:nvGrpSpPr>
+      <p:grpSpPr>
+        <a:xfrm>
+          <a:off x="0" y="0"/>
+          <a:ext cx="0" cy="0"/>
+          <a:chOff x="0" y="0"/>
+          <a:chExt cx="0" cy="0"/>
+        </a:xfrm>
+      </p:grpSpPr>
+      <p:sp>
+        <p:nvSpPr>
+          <p:cNvPr id="2" name="Titel 1"/>
+          <p:cNvSpPr>
+            <a:spLocks noGrp="1"/>
+          </p:cNvSpPr>
+          <p:nvPr>
+            <p:ph type="title"/>
+          </p:nvPr>
+        </p:nvSpPr>
+        <p:spPr/>
+        <p:txBody>
+          <a:bodyPr/>
+          <a:lstStyle/>
+          <a:p>
+            <a:r>
+              <a:rPr lang="de-DE" dirty="0"/>
+              <a:t>Konfigurationsmanagementplan</a:t>
+            </a:r>
+          </a:p>
+        </p:txBody>
+      </p:sp>
+      <p:sp>
+        <p:nvSpPr>
+          <p:cNvPr id="3" name="Inhaltsplatzhalter 2"/>
+          <p:cNvSpPr>
+            <a:spLocks noGrp="1"/>
+          </p:cNvSpPr>
+          <p:nvPr>
+            <p:ph idx="1"/>
+          </p:nvPr>
+        </p:nvSpPr>
+        <p:spPr/>
+        <p:txBody>
+          <a:bodyPr/>
+          <a:lstStyle/>
+          <a:p>
+            <a:pPr marL="0" indent="0">
+              <a:buNone/>
+            </a:pPr>
+            <a:r>
+              <a:rPr lang="de-DE" dirty="0"/>
+              <a:t>Der Konfigurationsmanagementprozess soll in einem </a:t>
+            </a:r>
+            <a:r>
+              <a:rPr lang="de-DE" b="1" dirty="0"/>
+              <a:t>Konfigurationsmanagementplan</a:t>
+            </a:r>
+            <a:r>
+              <a:rPr lang="de-DE" dirty="0"/>
+              <a:t> dokumentiert sein.</a:t>
+            </a:r>
+          </a:p>
+          <a:p>
+            <a:pPr marL="0" indent="0">
+              <a:buNone/>
+            </a:pPr>
+            <a:endParaRPr lang="de-DE" dirty="0"/>
+          </a:p>
+          <a:p>
+            <a:pPr marL="0" indent="0">
+              <a:buNone/>
+            </a:pPr>
+            <a:r>
+              <a:rPr lang="de-DE" dirty="0"/>
+              <a:t>Darin soll folgendes beantwortet werden:</a:t>
+            </a:r>
+          </a:p>
+          <a:p>
+            <a:r>
+              <a:rPr lang="de-DE" dirty="0"/>
+              <a:t>Welche Konfigurationsmanagementverfahren sind durchzuführen?</a:t>
+            </a:r>
+          </a:p>
+          <a:p>
+            <a:r>
+              <a:rPr lang="de-DE" dirty="0"/>
+              <a:t>Wer führt welches Verfahren durch?</a:t>
+            </a:r>
+          </a:p>
+          <a:p>
+            <a:r>
+              <a:rPr lang="de-DE" dirty="0"/>
+              <a:t>Wann wird welches Verfahren durchgeführt?</a:t>
+            </a:r>
+          </a:p>
+        </p:txBody>
+      </p:sp>
+      <p:sp>
+        <p:nvSpPr>
+          <p:cNvPr id="4" name="Foliennummernplatzhalter 3"/>
+          <p:cNvSpPr>
+            <a:spLocks noGrp="1"/>
+          </p:cNvSpPr>
+          <p:nvPr>
+            <p:ph type="sldNum" sz="quarter" idx="12"/>
+          </p:nvPr>
+        </p:nvSpPr>
+        <p:spPr/>
+        <p:txBody>
+          <a:bodyPr/>
+          <a:lstStyle/>
+          <a:p>
+            <a:fld id="{5C476CE9-DBD6-47B2-9488-80AA33A3CE56}" type="slidenum">
+              <a:rPr lang="en-US" smtClean="0"/>
+              <a:pPr/>
+              <a:t>12</a:t>
+            </a:fld>
+            <a:endParaRPr lang="en-US" dirty="0"/>
+          </a:p>
+        </p:txBody>
+      </p:sp>
+    </p:spTree>
+    <p:extLst>
+      <p:ext uri="{BB962C8B-B14F-4D97-AF65-F5344CB8AC3E}">
+        <p14:creationId xmlns:p14="http://schemas.microsoft.com/office/powerpoint/2010/main" val="1015107379"/>
+      </p:ext>
+    </p:extLst>
+  </p:cSld>
+  <p:clrMapOvr>
+    <a:masterClrMapping/>
+  </p:clrMapOvr>
+</p:sld>
+</file>
+
+<file path=ppt/slides/slide13.xml><?xml version="1.0" encoding="utf-8"?>
+<p:sld xmlns:a="http://schemas.openxmlformats.org/drawingml/2006/main" xmlns:r="http://schemas.openxmlformats.org/officeDocument/2006/relationships" xmlns:p="http://schemas.openxmlformats.org/presentationml/2006/main">
+  <p:cSld>
+    <p:spTree>
+      <p:nvGrpSpPr>
+        <p:cNvPr id="1" name=""/>
+        <p:cNvGrpSpPr/>
+        <p:nvPr/>
+      </p:nvGrpSpPr>
+      <p:grpSpPr>
+        <a:xfrm>
+          <a:off x="0" y="0"/>
+          <a:ext cx="0" cy="0"/>
+          <a:chOff x="0" y="0"/>
+          <a:chExt cx="0" cy="0"/>
+        </a:xfrm>
+      </p:grpSpPr>
+      <p:sp>
+        <p:nvSpPr>
+          <p:cNvPr id="2" name="Titel 1"/>
+          <p:cNvSpPr>
+            <a:spLocks noGrp="1"/>
+          </p:cNvSpPr>
+          <p:nvPr>
+            <p:ph type="title"/>
+          </p:nvPr>
+        </p:nvSpPr>
+        <p:spPr/>
+        <p:txBody>
+          <a:bodyPr/>
+          <a:lstStyle/>
+          <a:p>
+            <a:r>
+              <a:rPr lang="de-DE" dirty="0"/>
+              <a:t>Konfigurationsmanagementplan</a:t>
+            </a:r>
+          </a:p>
+        </p:txBody>
+      </p:sp>
+      <p:pic>
+        <p:nvPicPr>
+          <p:cNvPr id="5" name="Inhaltsplatzhalter 4"/>
+          <p:cNvPicPr>
+            <a:picLocks noGrp="1" noChangeAspect="1"/>
+          </p:cNvPicPr>
+          <p:nvPr>
+            <p:ph idx="1"/>
+          </p:nvPr>
+        </p:nvPicPr>
+        <p:blipFill>
+          <a:blip r:embed="rId3"/>
+          <a:stretch>
+            <a:fillRect/>
+          </a:stretch>
+        </p:blipFill>
+        <p:spPr>
+          <a:xfrm>
+            <a:off x="1536591" y="1825625"/>
+            <a:ext cx="6070818" cy="4351338"/>
+          </a:xfrm>
+          <a:prstGeom prst="rect">
+            <a:avLst/>
+          </a:prstGeom>
+        </p:spPr>
+      </p:pic>
+      <p:sp>
+        <p:nvSpPr>
+          <p:cNvPr id="4" name="Foliennummernplatzhalter 3"/>
+          <p:cNvSpPr>
+            <a:spLocks noGrp="1"/>
+          </p:cNvSpPr>
+          <p:nvPr>
+            <p:ph type="sldNum" sz="quarter" idx="12"/>
+          </p:nvPr>
+        </p:nvSpPr>
+        <p:spPr/>
+        <p:txBody>
+          <a:bodyPr/>
+          <a:lstStyle/>
+          <a:p>
+            <a:fld id="{5C476CE9-DBD6-47B2-9488-80AA33A3CE56}" type="slidenum">
+              <a:rPr lang="en-US" smtClean="0"/>
+              <a:pPr/>
+              <a:t>13</a:t>
+            </a:fld>
+            <a:endParaRPr lang="en-US" dirty="0"/>
+          </a:p>
+        </p:txBody>
+      </p:sp>
+    </p:spTree>
+    <p:extLst>
+      <p:ext uri="{BB962C8B-B14F-4D97-AF65-F5344CB8AC3E}">
+        <p14:creationId xmlns:p14="http://schemas.microsoft.com/office/powerpoint/2010/main" val="756874477"/>
+      </p:ext>
+    </p:extLst>
+  </p:cSld>
+  <p:clrMapOvr>
+    <a:masterClrMapping/>
+  </p:clrMapOvr>
+</p:sld>
+</file>
+
+<file path=ppt/slides/slide14.xml><?xml version="1.0" encoding="utf-8"?>
+<p:sld xmlns:a="http://schemas.openxmlformats.org/drawingml/2006/main" xmlns:r="http://schemas.openxmlformats.org/officeDocument/2006/relationships" xmlns:p="http://schemas.openxmlformats.org/presentationml/2006/main">
+  <p:cSld>
+    <p:spTree>
+      <p:nvGrpSpPr>
+        <p:cNvPr id="1" name=""/>
+        <p:cNvGrpSpPr/>
+        <p:nvPr/>
+      </p:nvGrpSpPr>
+      <p:grpSpPr>
+        <a:xfrm>
+          <a:off x="0" y="0"/>
+          <a:ext cx="0" cy="0"/>
+          <a:chOff x="0" y="0"/>
+          <a:chExt cx="0" cy="0"/>
+        </a:xfrm>
+      </p:grpSpPr>
+      <p:sp>
+        <p:nvSpPr>
+          <p:cNvPr id="2" name="Titel 1"/>
+          <p:cNvSpPr>
+            <a:spLocks noGrp="1"/>
+          </p:cNvSpPr>
+          <p:nvPr>
+            <p:ph type="title"/>
+          </p:nvPr>
+        </p:nvSpPr>
+        <p:spPr/>
+        <p:txBody>
+          <a:bodyPr/>
+          <a:lstStyle/>
+          <a:p>
+            <a:r>
+              <a:rPr lang="de-DE" dirty="0"/>
+              <a:t>Quellen</a:t>
+            </a:r>
+          </a:p>
+        </p:txBody>
+      </p:sp>
+      <p:sp>
+        <p:nvSpPr>
+          <p:cNvPr id="3" name="Inhaltsplatzhalter 2"/>
+          <p:cNvSpPr>
+            <a:spLocks noGrp="1"/>
+          </p:cNvSpPr>
+          <p:nvPr>
+            <p:ph idx="1"/>
+          </p:nvPr>
+        </p:nvSpPr>
+        <p:spPr/>
+        <p:txBody>
+          <a:bodyPr/>
+          <a:lstStyle/>
+          <a:p>
+            <a:r>
+              <a:rPr lang="de-DE" dirty="0"/>
+              <a:t>G. </a:t>
+            </a:r>
+            <a:r>
+              <a:rPr lang="de-DE" dirty="0" err="1"/>
+              <a:t>Weischedel</a:t>
+            </a:r>
+            <a:r>
+              <a:rPr lang="de-DE" dirty="0"/>
+              <a:t>. Konfigurationsmanagement, Springer-Verlag Berlin </a:t>
+            </a:r>
+            <a:r>
+              <a:rPr lang="de-DE" dirty="0" err="1"/>
+              <a:t>Heidleberg</a:t>
+            </a:r>
+            <a:r>
+              <a:rPr lang="de-DE" dirty="0"/>
+              <a:t>, 2003</a:t>
+            </a:r>
+          </a:p>
+          <a:p>
+            <a:r>
+              <a:rPr lang="de-DE" dirty="0"/>
+              <a:t>DIN EN ISO 10007:2003</a:t>
+            </a:r>
+          </a:p>
+        </p:txBody>
+      </p:sp>
+      <p:sp>
+        <p:nvSpPr>
+          <p:cNvPr id="4" name="Foliennummernplatzhalter 3"/>
+          <p:cNvSpPr>
+            <a:spLocks noGrp="1"/>
+          </p:cNvSpPr>
+          <p:nvPr>
+            <p:ph type="sldNum" sz="quarter" idx="12"/>
+          </p:nvPr>
+        </p:nvSpPr>
+        <p:spPr/>
+        <p:txBody>
+          <a:bodyPr/>
+          <a:lstStyle/>
+          <a:p>
+            <a:fld id="{5C476CE9-DBD6-47B2-9488-80AA33A3CE56}" type="slidenum">
+              <a:rPr lang="en-US" smtClean="0"/>
+              <a:pPr/>
+              <a:t>14</a:t>
+            </a:fld>
+            <a:endParaRPr lang="en-US" dirty="0"/>
+          </a:p>
+        </p:txBody>
+      </p:sp>
+    </p:spTree>
+    <p:extLst>
+      <p:ext uri="{BB962C8B-B14F-4D97-AF65-F5344CB8AC3E}">
+        <p14:creationId xmlns:p14="http://schemas.microsoft.com/office/powerpoint/2010/main" val="76482177"/>
+      </p:ext>
+    </p:extLst>
+  </p:cSld>
+  <p:clrMapOvr>
+    <a:masterClrMapping/>
+  </p:clrMapOvr>
+</p:sld>
+</file>
+
 <file path=ppt/slides/slide2.xml><?xml version="1.0" encoding="utf-8"?>
 <p:sld xmlns:a="http://schemas.openxmlformats.org/drawingml/2006/main" xmlns:r="http://schemas.openxmlformats.org/officeDocument/2006/relationships" xmlns:p="http://schemas.openxmlformats.org/presentationml/2006/main">
   <p:cSld>
@@ -5787,6 +7359,13 @@
               <a:t>Konfigurationsauditierung</a:t>
             </a:r>
             <a:endParaRPr lang="de-DE" dirty="0"/>
+          </a:p>
+          <a:p>
+            <a:pPr lvl="1"/>
+            <a:r>
+              <a:rPr lang="de-DE" dirty="0"/>
+              <a:t>Konfigurationsmanagementplan</a:t>
+            </a:r>
           </a:p>
         </p:txBody>
       </p:sp>
@@ -6014,6 +7593,914 @@
     <p:extLst>
       <p:ext uri="{BB962C8B-B14F-4D97-AF65-F5344CB8AC3E}">
         <p14:creationId xmlns:p14="http://schemas.microsoft.com/office/powerpoint/2010/main" val="1307304839"/>
+      </p:ext>
+    </p:extLst>
+  </p:cSld>
+  <p:clrMapOvr>
+    <a:masterClrMapping/>
+  </p:clrMapOvr>
+</p:sld>
+</file>
+
+<file path=ppt/slides/slide4.xml><?xml version="1.0" encoding="utf-8"?>
+<p:sld xmlns:a="http://schemas.openxmlformats.org/drawingml/2006/main" xmlns:r="http://schemas.openxmlformats.org/officeDocument/2006/relationships" xmlns:p="http://schemas.openxmlformats.org/presentationml/2006/main">
+  <p:cSld>
+    <p:spTree>
+      <p:nvGrpSpPr>
+        <p:cNvPr id="1" name=""/>
+        <p:cNvGrpSpPr/>
+        <p:nvPr/>
+      </p:nvGrpSpPr>
+      <p:grpSpPr>
+        <a:xfrm>
+          <a:off x="0" y="0"/>
+          <a:ext cx="0" cy="0"/>
+          <a:chOff x="0" y="0"/>
+          <a:chExt cx="0" cy="0"/>
+        </a:xfrm>
+      </p:grpSpPr>
+      <p:sp>
+        <p:nvSpPr>
+          <p:cNvPr id="2" name="Titel 1"/>
+          <p:cNvSpPr>
+            <a:spLocks noGrp="1"/>
+          </p:cNvSpPr>
+          <p:nvPr>
+            <p:ph type="title"/>
+          </p:nvPr>
+        </p:nvSpPr>
+        <p:spPr/>
+        <p:txBody>
+          <a:bodyPr/>
+          <a:lstStyle/>
+          <a:p>
+            <a:r>
+              <a:rPr lang="de-DE" sz="3200" dirty="0"/>
+              <a:t>Einführung</a:t>
+            </a:r>
+            <a:endParaRPr lang="de-DE" dirty="0"/>
+          </a:p>
+        </p:txBody>
+      </p:sp>
+      <p:sp>
+        <p:nvSpPr>
+          <p:cNvPr id="3" name="Inhaltsplatzhalter 2"/>
+          <p:cNvSpPr>
+            <a:spLocks noGrp="1"/>
+          </p:cNvSpPr>
+          <p:nvPr>
+            <p:ph idx="1"/>
+          </p:nvPr>
+        </p:nvSpPr>
+        <p:spPr>
+          <a:xfrm>
+            <a:off x="628650" y="1825625"/>
+            <a:ext cx="6305550" cy="4351338"/>
+          </a:xfrm>
+        </p:spPr>
+        <p:txBody>
+          <a:bodyPr/>
+          <a:lstStyle/>
+          <a:p>
+            <a:r>
+              <a:rPr lang="de-DE" dirty="0"/>
+              <a:t>Ähnliche Probleme auch in der Softwareentwicklung:</a:t>
+            </a:r>
+          </a:p>
+          <a:p>
+            <a:pPr lvl="1"/>
+            <a:r>
+              <a:rPr lang="de-DE" dirty="0" err="1"/>
+              <a:t>Undokumentierte</a:t>
+            </a:r>
+            <a:r>
+              <a:rPr lang="de-DE" dirty="0"/>
+              <a:t> Änderungen von Code</a:t>
+            </a:r>
+          </a:p>
+          <a:p>
+            <a:pPr lvl="1"/>
+            <a:r>
+              <a:rPr lang="de-DE" dirty="0"/>
+              <a:t>Kurzfristige Änderungen vor Auslieferung</a:t>
+            </a:r>
+          </a:p>
+          <a:p>
+            <a:pPr lvl="1"/>
+            <a:r>
+              <a:rPr lang="de-DE" dirty="0"/>
+              <a:t>Softwareerzeugnisse lassen sich nicht mehr reproduzieren</a:t>
+            </a:r>
+          </a:p>
+          <a:p>
+            <a:pPr marL="0" indent="0">
+              <a:buNone/>
+            </a:pPr>
+            <a:r>
+              <a:rPr lang="de-DE" dirty="0">
+                <a:sym typeface="Wingdings" panose="05000000000000000000" pitchFamily="2" charset="2"/>
+              </a:rPr>
+              <a:t> Konfigurationsmanagement wird Teil von Reifegradmodellen</a:t>
+            </a:r>
+            <a:endParaRPr lang="de-DE" dirty="0"/>
+          </a:p>
+        </p:txBody>
+      </p:sp>
+      <p:sp>
+        <p:nvSpPr>
+          <p:cNvPr id="4" name="Foliennummernplatzhalter 3"/>
+          <p:cNvSpPr>
+            <a:spLocks noGrp="1"/>
+          </p:cNvSpPr>
+          <p:nvPr>
+            <p:ph type="sldNum" sz="quarter" idx="12"/>
+          </p:nvPr>
+        </p:nvSpPr>
+        <p:spPr/>
+        <p:txBody>
+          <a:bodyPr/>
+          <a:lstStyle/>
+          <a:p>
+            <a:fld id="{5C476CE9-DBD6-47B2-9488-80AA33A3CE56}" type="slidenum">
+              <a:rPr lang="en-US" smtClean="0"/>
+              <a:pPr/>
+              <a:t>4</a:t>
+            </a:fld>
+            <a:endParaRPr lang="en-US" dirty="0"/>
+          </a:p>
+        </p:txBody>
+      </p:sp>
+    </p:spTree>
+    <p:extLst>
+      <p:ext uri="{BB962C8B-B14F-4D97-AF65-F5344CB8AC3E}">
+        <p14:creationId xmlns:p14="http://schemas.microsoft.com/office/powerpoint/2010/main" val="863756826"/>
+      </p:ext>
+    </p:extLst>
+  </p:cSld>
+  <p:clrMapOvr>
+    <a:masterClrMapping/>
+  </p:clrMapOvr>
+</p:sld>
+</file>
+
+<file path=ppt/slides/slide5.xml><?xml version="1.0" encoding="utf-8"?>
+<p:sld xmlns:a="http://schemas.openxmlformats.org/drawingml/2006/main" xmlns:r="http://schemas.openxmlformats.org/officeDocument/2006/relationships" xmlns:p="http://schemas.openxmlformats.org/presentationml/2006/main">
+  <p:cSld>
+    <p:spTree>
+      <p:nvGrpSpPr>
+        <p:cNvPr id="1" name=""/>
+        <p:cNvGrpSpPr/>
+        <p:nvPr/>
+      </p:nvGrpSpPr>
+      <p:grpSpPr>
+        <a:xfrm>
+          <a:off x="0" y="0"/>
+          <a:ext cx="0" cy="0"/>
+          <a:chOff x="0" y="0"/>
+          <a:chExt cx="0" cy="0"/>
+        </a:xfrm>
+      </p:grpSpPr>
+      <p:sp>
+        <p:nvSpPr>
+          <p:cNvPr id="2" name="Titel 1"/>
+          <p:cNvSpPr>
+            <a:spLocks noGrp="1"/>
+          </p:cNvSpPr>
+          <p:nvPr>
+            <p:ph type="title"/>
+          </p:nvPr>
+        </p:nvSpPr>
+        <p:spPr/>
+        <p:txBody>
+          <a:bodyPr/>
+          <a:lstStyle/>
+          <a:p>
+            <a:r>
+              <a:rPr lang="de-DE" sz="3200" dirty="0"/>
+              <a:t>Grundlagen des Konfigurationsmanagements</a:t>
+            </a:r>
+            <a:endParaRPr lang="de-DE" dirty="0"/>
+          </a:p>
+        </p:txBody>
+      </p:sp>
+      <p:sp>
+        <p:nvSpPr>
+          <p:cNvPr id="3" name="Inhaltsplatzhalter 2"/>
+          <p:cNvSpPr>
+            <a:spLocks noGrp="1"/>
+          </p:cNvSpPr>
+          <p:nvPr>
+            <p:ph idx="1"/>
+          </p:nvPr>
+        </p:nvSpPr>
+        <p:spPr>
+          <a:xfrm>
+            <a:off x="628650" y="1825625"/>
+            <a:ext cx="7886700" cy="4351338"/>
+          </a:xfrm>
+        </p:spPr>
+        <p:txBody>
+          <a:bodyPr>
+            <a:normAutofit/>
+          </a:bodyPr>
+          <a:lstStyle/>
+          <a:p>
+            <a:pPr marL="0" indent="0">
+              <a:buNone/>
+            </a:pPr>
+            <a:r>
+              <a:rPr lang="de-DE" b="1" dirty="0"/>
+              <a:t>Definition nach DIN EN ISO 10007:</a:t>
+            </a:r>
+          </a:p>
+          <a:p>
+            <a:pPr marL="0" indent="0">
+              <a:buNone/>
+            </a:pPr>
+            <a:r>
+              <a:rPr lang="de-DE" dirty="0"/>
+              <a:t>KM ist eine Managementdisziplin, die über die gesamte Lebensdauer eines Erzeugnisses angewandt wird, um Transparenz und Überwachung seiner funktionellen und physischen Merkmale sicherzustellen. Hauptziel von KM ist, die gegenwärtige Konfiguration eines Erzeugnisses sowie den Stand der Erfüllung seiner physischen und funktionellen Forderungen zu dokumentieren und volle Transparenz herzustellen. Ein weiteres Ziel ist, dass jeder am Projekt Mitwirkende zu jeder Zeit des </a:t>
+            </a:r>
+            <a:r>
+              <a:rPr lang="de-DE" dirty="0" err="1"/>
+              <a:t>Erzeugnislebenslaufs</a:t>
+            </a:r>
+            <a:r>
+              <a:rPr lang="de-DE" dirty="0"/>
+              <a:t> die richtige und zutreffende Dokumentation verwendet. </a:t>
+            </a:r>
+          </a:p>
+        </p:txBody>
+      </p:sp>
+      <p:sp>
+        <p:nvSpPr>
+          <p:cNvPr id="4" name="Foliennummernplatzhalter 3"/>
+          <p:cNvSpPr>
+            <a:spLocks noGrp="1"/>
+          </p:cNvSpPr>
+          <p:nvPr>
+            <p:ph type="sldNum" sz="quarter" idx="12"/>
+          </p:nvPr>
+        </p:nvSpPr>
+        <p:spPr/>
+        <p:txBody>
+          <a:bodyPr/>
+          <a:lstStyle/>
+          <a:p>
+            <a:fld id="{5C476CE9-DBD6-47B2-9488-80AA33A3CE56}" type="slidenum">
+              <a:rPr lang="en-US" smtClean="0"/>
+              <a:pPr/>
+              <a:t>5</a:t>
+            </a:fld>
+            <a:endParaRPr lang="en-US" dirty="0"/>
+          </a:p>
+        </p:txBody>
+      </p:sp>
+    </p:spTree>
+    <p:extLst>
+      <p:ext uri="{BB962C8B-B14F-4D97-AF65-F5344CB8AC3E}">
+        <p14:creationId xmlns:p14="http://schemas.microsoft.com/office/powerpoint/2010/main" val="2169875993"/>
+      </p:ext>
+    </p:extLst>
+  </p:cSld>
+  <p:clrMapOvr>
+    <a:masterClrMapping/>
+  </p:clrMapOvr>
+</p:sld>
+</file>
+
+<file path=ppt/slides/slide6.xml><?xml version="1.0" encoding="utf-8"?>
+<p:sld xmlns:a="http://schemas.openxmlformats.org/drawingml/2006/main" xmlns:r="http://schemas.openxmlformats.org/officeDocument/2006/relationships" xmlns:p="http://schemas.openxmlformats.org/presentationml/2006/main">
+  <p:cSld>
+    <p:spTree>
+      <p:nvGrpSpPr>
+        <p:cNvPr id="1" name=""/>
+        <p:cNvGrpSpPr/>
+        <p:nvPr/>
+      </p:nvGrpSpPr>
+      <p:grpSpPr>
+        <a:xfrm>
+          <a:off x="0" y="0"/>
+          <a:ext cx="0" cy="0"/>
+          <a:chOff x="0" y="0"/>
+          <a:chExt cx="0" cy="0"/>
+        </a:xfrm>
+      </p:grpSpPr>
+      <p:sp>
+        <p:nvSpPr>
+          <p:cNvPr id="2" name="Titel 1"/>
+          <p:cNvSpPr>
+            <a:spLocks noGrp="1"/>
+          </p:cNvSpPr>
+          <p:nvPr>
+            <p:ph type="title"/>
+          </p:nvPr>
+        </p:nvSpPr>
+        <p:spPr/>
+        <p:txBody>
+          <a:bodyPr/>
+          <a:lstStyle/>
+          <a:p>
+            <a:r>
+              <a:rPr lang="de-DE" dirty="0"/>
+              <a:t>Grundlagen des Konfigurationsmanagements</a:t>
+            </a:r>
+          </a:p>
+        </p:txBody>
+      </p:sp>
+      <p:sp>
+        <p:nvSpPr>
+          <p:cNvPr id="3" name="Inhaltsplatzhalter 2"/>
+          <p:cNvSpPr>
+            <a:spLocks noGrp="1"/>
+          </p:cNvSpPr>
+          <p:nvPr>
+            <p:ph idx="1"/>
+          </p:nvPr>
+        </p:nvSpPr>
+        <p:spPr/>
+        <p:txBody>
+          <a:bodyPr/>
+          <a:lstStyle/>
+          <a:p>
+            <a:pPr marL="0" indent="0">
+              <a:buNone/>
+            </a:pPr>
+            <a:r>
+              <a:rPr lang="de-DE" dirty="0"/>
+              <a:t>Der KM Prozess umfasst die folgenden integrierten Tätigkeiten:</a:t>
+            </a:r>
+          </a:p>
+          <a:p>
+            <a:pPr marL="0" indent="0">
+              <a:buNone/>
+            </a:pPr>
+            <a:endParaRPr lang="de-DE" dirty="0"/>
+          </a:p>
+          <a:p>
+            <a:r>
+              <a:rPr lang="de-DE" dirty="0"/>
+              <a:t>Konfigurationsidentifizierung</a:t>
+            </a:r>
+          </a:p>
+          <a:p>
+            <a:r>
+              <a:rPr lang="de-DE" dirty="0"/>
+              <a:t>Konfigurationsüberwachung</a:t>
+            </a:r>
+          </a:p>
+          <a:p>
+            <a:r>
+              <a:rPr lang="de-DE" dirty="0"/>
+              <a:t>Konfigurationsbuchführung</a:t>
+            </a:r>
+          </a:p>
+          <a:p>
+            <a:r>
+              <a:rPr lang="de-DE" dirty="0" err="1"/>
+              <a:t>Konfigurationsauditierung</a:t>
+            </a:r>
+            <a:endParaRPr lang="de-DE" dirty="0"/>
+          </a:p>
+          <a:p>
+            <a:endParaRPr lang="de-DE" dirty="0"/>
+          </a:p>
+        </p:txBody>
+      </p:sp>
+      <p:sp>
+        <p:nvSpPr>
+          <p:cNvPr id="4" name="Foliennummernplatzhalter 3"/>
+          <p:cNvSpPr>
+            <a:spLocks noGrp="1"/>
+          </p:cNvSpPr>
+          <p:nvPr>
+            <p:ph type="sldNum" sz="quarter" idx="12"/>
+          </p:nvPr>
+        </p:nvSpPr>
+        <p:spPr/>
+        <p:txBody>
+          <a:bodyPr/>
+          <a:lstStyle/>
+          <a:p>
+            <a:fld id="{5C476CE9-DBD6-47B2-9488-80AA33A3CE56}" type="slidenum">
+              <a:rPr lang="en-US" smtClean="0"/>
+              <a:pPr/>
+              <a:t>6</a:t>
+            </a:fld>
+            <a:endParaRPr lang="en-US" dirty="0"/>
+          </a:p>
+        </p:txBody>
+      </p:sp>
+    </p:spTree>
+    <p:extLst>
+      <p:ext uri="{BB962C8B-B14F-4D97-AF65-F5344CB8AC3E}">
+        <p14:creationId xmlns:p14="http://schemas.microsoft.com/office/powerpoint/2010/main" val="3305157594"/>
+      </p:ext>
+    </p:extLst>
+  </p:cSld>
+  <p:clrMapOvr>
+    <a:masterClrMapping/>
+  </p:clrMapOvr>
+</p:sld>
+</file>
+
+<file path=ppt/slides/slide7.xml><?xml version="1.0" encoding="utf-8"?>
+<p:sld xmlns:a="http://schemas.openxmlformats.org/drawingml/2006/main" xmlns:r="http://schemas.openxmlformats.org/officeDocument/2006/relationships" xmlns:p="http://schemas.openxmlformats.org/presentationml/2006/main">
+  <p:cSld>
+    <p:spTree>
+      <p:nvGrpSpPr>
+        <p:cNvPr id="1" name=""/>
+        <p:cNvGrpSpPr/>
+        <p:nvPr/>
+      </p:nvGrpSpPr>
+      <p:grpSpPr>
+        <a:xfrm>
+          <a:off x="0" y="0"/>
+          <a:ext cx="0" cy="0"/>
+          <a:chOff x="0" y="0"/>
+          <a:chExt cx="0" cy="0"/>
+        </a:xfrm>
+      </p:grpSpPr>
+      <p:sp>
+        <p:nvSpPr>
+          <p:cNvPr id="2" name="Titel 1"/>
+          <p:cNvSpPr>
+            <a:spLocks noGrp="1"/>
+          </p:cNvSpPr>
+          <p:nvPr>
+            <p:ph type="title"/>
+          </p:nvPr>
+        </p:nvSpPr>
+        <p:spPr/>
+        <p:txBody>
+          <a:bodyPr/>
+          <a:lstStyle/>
+          <a:p>
+            <a:r>
+              <a:rPr lang="de-DE" dirty="0"/>
+              <a:t>Konfigurationsidentifizierung</a:t>
+            </a:r>
+          </a:p>
+        </p:txBody>
+      </p:sp>
+      <p:sp>
+        <p:nvSpPr>
+          <p:cNvPr id="3" name="Inhaltsplatzhalter 2"/>
+          <p:cNvSpPr>
+            <a:spLocks noGrp="1"/>
+          </p:cNvSpPr>
+          <p:nvPr>
+            <p:ph idx="1"/>
+          </p:nvPr>
+        </p:nvSpPr>
+        <p:spPr/>
+        <p:txBody>
+          <a:bodyPr/>
+          <a:lstStyle/>
+          <a:p>
+            <a:r>
+              <a:rPr lang="de-DE" dirty="0"/>
+              <a:t>Festlegung und Beschreibung von </a:t>
+            </a:r>
+            <a:r>
+              <a:rPr lang="de-DE" b="1" dirty="0"/>
+              <a:t>Konfigurationseinheiten</a:t>
+            </a:r>
+          </a:p>
+          <a:p>
+            <a:pPr lvl="1"/>
+            <a:r>
+              <a:rPr lang="de-DE" b="1" dirty="0"/>
+              <a:t>Konfigurationseinheit</a:t>
+            </a:r>
+            <a:r>
+              <a:rPr lang="de-DE" dirty="0"/>
+              <a:t>: beliebige Kombination von Hardware, Software und Dienstleistung</a:t>
+            </a:r>
+          </a:p>
+          <a:p>
+            <a:r>
+              <a:rPr lang="de-DE" dirty="0"/>
+              <a:t>Definition der physischen und funktionellen Merkmale der Einheiten in </a:t>
+            </a:r>
+            <a:r>
+              <a:rPr lang="de-DE" b="1" dirty="0"/>
+              <a:t>Konfigurationsdokumenten</a:t>
+            </a:r>
+          </a:p>
+          <a:p>
+            <a:r>
+              <a:rPr lang="de-DE" dirty="0"/>
+              <a:t>Bestimmung von Regeln, nach denen alle Artefakte eindeutig nummeriert werden</a:t>
+            </a:r>
+          </a:p>
+          <a:p>
+            <a:r>
+              <a:rPr lang="de-DE" dirty="0"/>
+              <a:t>Definition von </a:t>
+            </a:r>
+            <a:r>
+              <a:rPr lang="de-DE" b="1" dirty="0"/>
+              <a:t>Bezugskonfigurationen</a:t>
+            </a:r>
+          </a:p>
+        </p:txBody>
+      </p:sp>
+      <p:sp>
+        <p:nvSpPr>
+          <p:cNvPr id="4" name="Foliennummernplatzhalter 3"/>
+          <p:cNvSpPr>
+            <a:spLocks noGrp="1"/>
+          </p:cNvSpPr>
+          <p:nvPr>
+            <p:ph type="sldNum" sz="quarter" idx="12"/>
+          </p:nvPr>
+        </p:nvSpPr>
+        <p:spPr/>
+        <p:txBody>
+          <a:bodyPr/>
+          <a:lstStyle/>
+          <a:p>
+            <a:fld id="{5C476CE9-DBD6-47B2-9488-80AA33A3CE56}" type="slidenum">
+              <a:rPr lang="en-US" smtClean="0"/>
+              <a:pPr/>
+              <a:t>7</a:t>
+            </a:fld>
+            <a:endParaRPr lang="en-US" dirty="0"/>
+          </a:p>
+        </p:txBody>
+      </p:sp>
+      <p:pic>
+        <p:nvPicPr>
+          <p:cNvPr id="1026" name="Picture 2" descr="http://oka-online.com/wp-content/uploads/2013/12/track-trace-asset-identification.gif"/>
+          <p:cNvPicPr>
+            <a:picLocks noChangeAspect="1" noChangeArrowheads="1"/>
+          </p:cNvPicPr>
+          <p:nvPr/>
+        </p:nvPicPr>
+        <p:blipFill>
+          <a:blip r:embed="rId3">
+            <a:extLst>
+              <a:ext uri="{28A0092B-C50C-407E-A947-70E740481C1C}">
+                <a14:useLocalDpi xmlns:a14="http://schemas.microsoft.com/office/drawing/2010/main" val="0"/>
+              </a:ext>
+            </a:extLst>
+          </a:blip>
+          <a:srcRect/>
+          <a:stretch>
+            <a:fillRect/>
+          </a:stretch>
+        </p:blipFill>
+        <p:spPr bwMode="auto">
+          <a:xfrm>
+            <a:off x="6246182" y="4175918"/>
+            <a:ext cx="2519036" cy="2189163"/>
+          </a:xfrm>
+          <a:prstGeom prst="rect">
+            <a:avLst/>
+          </a:prstGeom>
+          <a:noFill/>
+          <a:extLst>
+            <a:ext uri="{909E8E84-426E-40DD-AFC4-6F175D3DCCD1}">
+              <a14:hiddenFill xmlns:a14="http://schemas.microsoft.com/office/drawing/2010/main">
+                <a:solidFill>
+                  <a:srgbClr val="FFFFFF"/>
+                </a:solidFill>
+              </a14:hiddenFill>
+            </a:ext>
+          </a:extLst>
+        </p:spPr>
+      </p:pic>
+    </p:spTree>
+    <p:extLst>
+      <p:ext uri="{BB962C8B-B14F-4D97-AF65-F5344CB8AC3E}">
+        <p14:creationId xmlns:p14="http://schemas.microsoft.com/office/powerpoint/2010/main" val="2476898611"/>
+      </p:ext>
+    </p:extLst>
+  </p:cSld>
+  <p:clrMapOvr>
+    <a:masterClrMapping/>
+  </p:clrMapOvr>
+</p:sld>
+</file>
+
+<file path=ppt/slides/slide8.xml><?xml version="1.0" encoding="utf-8"?>
+<p:sld xmlns:a="http://schemas.openxmlformats.org/drawingml/2006/main" xmlns:r="http://schemas.openxmlformats.org/officeDocument/2006/relationships" xmlns:p="http://schemas.openxmlformats.org/presentationml/2006/main">
+  <p:cSld>
+    <p:spTree>
+      <p:nvGrpSpPr>
+        <p:cNvPr id="1" name=""/>
+        <p:cNvGrpSpPr/>
+        <p:nvPr/>
+      </p:nvGrpSpPr>
+      <p:grpSpPr>
+        <a:xfrm>
+          <a:off x="0" y="0"/>
+          <a:ext cx="0" cy="0"/>
+          <a:chOff x="0" y="0"/>
+          <a:chExt cx="0" cy="0"/>
+        </a:xfrm>
+      </p:grpSpPr>
+      <p:sp>
+        <p:nvSpPr>
+          <p:cNvPr id="2" name="Titel 1"/>
+          <p:cNvSpPr>
+            <a:spLocks noGrp="1"/>
+          </p:cNvSpPr>
+          <p:nvPr>
+            <p:ph type="title"/>
+          </p:nvPr>
+        </p:nvSpPr>
+        <p:spPr/>
+        <p:txBody>
+          <a:bodyPr/>
+          <a:lstStyle/>
+          <a:p>
+            <a:r>
+              <a:rPr lang="de-DE" dirty="0"/>
+              <a:t>Konfigurationsüberwachung</a:t>
+            </a:r>
+          </a:p>
+        </p:txBody>
+      </p:sp>
+      <p:sp>
+        <p:nvSpPr>
+          <p:cNvPr id="3" name="Inhaltsplatzhalter 2"/>
+          <p:cNvSpPr>
+            <a:spLocks noGrp="1"/>
+          </p:cNvSpPr>
+          <p:nvPr>
+            <p:ph idx="1"/>
+          </p:nvPr>
+        </p:nvSpPr>
+        <p:spPr/>
+        <p:txBody>
+          <a:bodyPr/>
+          <a:lstStyle/>
+          <a:p>
+            <a:pPr marL="0" indent="0">
+              <a:buNone/>
+            </a:pPr>
+            <a:endParaRPr lang="de-DE" dirty="0"/>
+          </a:p>
+          <a:p>
+            <a:pPr marL="0" indent="0">
+              <a:buNone/>
+            </a:pPr>
+            <a:r>
+              <a:rPr lang="de-DE" dirty="0"/>
+              <a:t>Überwachung der Änderungen mit den folgenden Tätigkeiten:</a:t>
+            </a:r>
+          </a:p>
+          <a:p>
+            <a:pPr marL="0" indent="0">
+              <a:buNone/>
+            </a:pPr>
+            <a:endParaRPr lang="de-DE" dirty="0"/>
+          </a:p>
+          <a:p>
+            <a:r>
+              <a:rPr lang="de-DE" dirty="0"/>
+              <a:t>Dokumentation und Begründung von Änderungen</a:t>
+            </a:r>
+          </a:p>
+          <a:p>
+            <a:r>
+              <a:rPr lang="de-DE" dirty="0"/>
+              <a:t>Beurteilung der Auswirkungen von Änderungen</a:t>
+            </a:r>
+          </a:p>
+          <a:p>
+            <a:r>
+              <a:rPr lang="de-DE" dirty="0"/>
+              <a:t>Genehmigung oder Ablehnung der Änderung</a:t>
+            </a:r>
+          </a:p>
+        </p:txBody>
+      </p:sp>
+      <p:sp>
+        <p:nvSpPr>
+          <p:cNvPr id="4" name="Foliennummernplatzhalter 3"/>
+          <p:cNvSpPr>
+            <a:spLocks noGrp="1"/>
+          </p:cNvSpPr>
+          <p:nvPr>
+            <p:ph type="sldNum" sz="quarter" idx="12"/>
+          </p:nvPr>
+        </p:nvSpPr>
+        <p:spPr/>
+        <p:txBody>
+          <a:bodyPr/>
+          <a:lstStyle/>
+          <a:p>
+            <a:fld id="{5C476CE9-DBD6-47B2-9488-80AA33A3CE56}" type="slidenum">
+              <a:rPr lang="en-US" smtClean="0"/>
+              <a:pPr/>
+              <a:t>8</a:t>
+            </a:fld>
+            <a:endParaRPr lang="en-US" dirty="0"/>
+          </a:p>
+        </p:txBody>
+      </p:sp>
+      <p:pic>
+        <p:nvPicPr>
+          <p:cNvPr id="2050" name="Picture 2" descr="http://talkincloud.com/site-files/talkincloud.com/files/imagecache/medium_img/uploads/2012/12/cloud-monitoring.jpeg"/>
+          <p:cNvPicPr>
+            <a:picLocks noChangeAspect="1" noChangeArrowheads="1"/>
+          </p:cNvPicPr>
+          <p:nvPr/>
+        </p:nvPicPr>
+        <p:blipFill>
+          <a:blip r:embed="rId3">
+            <a:extLst>
+              <a:ext uri="{28A0092B-C50C-407E-A947-70E740481C1C}">
+                <a14:useLocalDpi xmlns:a14="http://schemas.microsoft.com/office/drawing/2010/main" val="0"/>
+              </a:ext>
+            </a:extLst>
+          </a:blip>
+          <a:srcRect/>
+          <a:stretch>
+            <a:fillRect/>
+          </a:stretch>
+        </p:blipFill>
+        <p:spPr bwMode="auto">
+          <a:xfrm>
+            <a:off x="6133775" y="4629150"/>
+            <a:ext cx="2743849" cy="1547813"/>
+          </a:xfrm>
+          <a:prstGeom prst="rect">
+            <a:avLst/>
+          </a:prstGeom>
+          <a:noFill/>
+          <a:extLst>
+            <a:ext uri="{909E8E84-426E-40DD-AFC4-6F175D3DCCD1}">
+              <a14:hiddenFill xmlns:a14="http://schemas.microsoft.com/office/drawing/2010/main">
+                <a:solidFill>
+                  <a:srgbClr val="FFFFFF"/>
+                </a:solidFill>
+              </a14:hiddenFill>
+            </a:ext>
+          </a:extLst>
+        </p:spPr>
+      </p:pic>
+    </p:spTree>
+    <p:extLst>
+      <p:ext uri="{BB962C8B-B14F-4D97-AF65-F5344CB8AC3E}">
+        <p14:creationId xmlns:p14="http://schemas.microsoft.com/office/powerpoint/2010/main" val="2738077160"/>
+      </p:ext>
+    </p:extLst>
+  </p:cSld>
+  <p:clrMapOvr>
+    <a:masterClrMapping/>
+  </p:clrMapOvr>
+</p:sld>
+</file>
+
+<file path=ppt/slides/slide9.xml><?xml version="1.0" encoding="utf-8"?>
+<p:sld xmlns:a="http://schemas.openxmlformats.org/drawingml/2006/main" xmlns:r="http://schemas.openxmlformats.org/officeDocument/2006/relationships" xmlns:p="http://schemas.openxmlformats.org/presentationml/2006/main">
+  <p:cSld>
+    <p:spTree>
+      <p:nvGrpSpPr>
+        <p:cNvPr id="1" name=""/>
+        <p:cNvGrpSpPr/>
+        <p:nvPr/>
+      </p:nvGrpSpPr>
+      <p:grpSpPr>
+        <a:xfrm>
+          <a:off x="0" y="0"/>
+          <a:ext cx="0" cy="0"/>
+          <a:chOff x="0" y="0"/>
+          <a:chExt cx="0" cy="0"/>
+        </a:xfrm>
+      </p:grpSpPr>
+      <p:sp>
+        <p:nvSpPr>
+          <p:cNvPr id="2" name="Titel 1"/>
+          <p:cNvSpPr>
+            <a:spLocks noGrp="1"/>
+          </p:cNvSpPr>
+          <p:nvPr>
+            <p:ph type="title"/>
+          </p:nvPr>
+        </p:nvSpPr>
+        <p:spPr/>
+        <p:txBody>
+          <a:bodyPr/>
+          <a:lstStyle/>
+          <a:p>
+            <a:r>
+              <a:rPr lang="de-DE" dirty="0"/>
+              <a:t>Konfigurationsbuchführung</a:t>
+            </a:r>
+          </a:p>
+        </p:txBody>
+      </p:sp>
+      <p:sp>
+        <p:nvSpPr>
+          <p:cNvPr id="3" name="Inhaltsplatzhalter 2"/>
+          <p:cNvSpPr>
+            <a:spLocks noGrp="1"/>
+          </p:cNvSpPr>
+          <p:nvPr>
+            <p:ph idx="1"/>
+          </p:nvPr>
+        </p:nvSpPr>
+        <p:spPr/>
+        <p:txBody>
+          <a:bodyPr/>
+          <a:lstStyle/>
+          <a:p>
+            <a:endParaRPr lang="de-DE" dirty="0"/>
+          </a:p>
+          <a:p>
+            <a:r>
+              <a:rPr lang="de-DE" dirty="0"/>
+              <a:t>Ermöglicht Rückverfolgbarkeit von Änderungen</a:t>
+            </a:r>
+          </a:p>
+          <a:p>
+            <a:r>
+              <a:rPr lang="de-DE" dirty="0"/>
+              <a:t>Notwendige Aufzeichnungen resultieren als Nebenprodukt aus Konfigurationsidentifizierung und Konfigurationsüberwachung</a:t>
+            </a:r>
+          </a:p>
+          <a:p>
+            <a:r>
+              <a:rPr lang="de-DE" dirty="0"/>
+              <a:t>Lässt alle Änderungen bis zur letzten Bezugskonfiguration nachvollziehen</a:t>
+            </a:r>
+          </a:p>
+        </p:txBody>
+      </p:sp>
+      <p:sp>
+        <p:nvSpPr>
+          <p:cNvPr id="4" name="Foliennummernplatzhalter 3"/>
+          <p:cNvSpPr>
+            <a:spLocks noGrp="1"/>
+          </p:cNvSpPr>
+          <p:nvPr>
+            <p:ph type="sldNum" sz="quarter" idx="12"/>
+          </p:nvPr>
+        </p:nvSpPr>
+        <p:spPr/>
+        <p:txBody>
+          <a:bodyPr/>
+          <a:lstStyle/>
+          <a:p>
+            <a:fld id="{5C476CE9-DBD6-47B2-9488-80AA33A3CE56}" type="slidenum">
+              <a:rPr lang="en-US" smtClean="0"/>
+              <a:pPr/>
+              <a:t>9</a:t>
+            </a:fld>
+            <a:endParaRPr lang="en-US" dirty="0"/>
+          </a:p>
+        </p:txBody>
+      </p:sp>
+      <p:pic>
+        <p:nvPicPr>
+          <p:cNvPr id="4098" name="Picture 2" descr="https://static.pexels.com/photos/53621/calculator-calculation-insurance-finance-53621.jpeg"/>
+          <p:cNvPicPr>
+            <a:picLocks noChangeAspect="1" noChangeArrowheads="1"/>
+          </p:cNvPicPr>
+          <p:nvPr/>
+        </p:nvPicPr>
+        <p:blipFill>
+          <a:blip r:embed="rId3" cstate="print">
+            <a:extLst>
+              <a:ext uri="{28A0092B-C50C-407E-A947-70E740481C1C}">
+                <a14:useLocalDpi xmlns:a14="http://schemas.microsoft.com/office/drawing/2010/main" val="0"/>
+              </a:ext>
+            </a:extLst>
+          </a:blip>
+          <a:srcRect/>
+          <a:stretch>
+            <a:fillRect/>
+          </a:stretch>
+        </p:blipFill>
+        <p:spPr bwMode="auto">
+          <a:xfrm>
+            <a:off x="6301585" y="4758309"/>
+            <a:ext cx="2408230" cy="1418654"/>
+          </a:xfrm>
+          <a:prstGeom prst="rect">
+            <a:avLst/>
+          </a:prstGeom>
+          <a:noFill/>
+          <a:extLst>
+            <a:ext uri="{909E8E84-426E-40DD-AFC4-6F175D3DCCD1}">
+              <a14:hiddenFill xmlns:a14="http://schemas.microsoft.com/office/drawing/2010/main">
+                <a:solidFill>
+                  <a:srgbClr val="FFFFFF"/>
+                </a:solidFill>
+              </a14:hiddenFill>
+            </a:ext>
+          </a:extLst>
+        </p:spPr>
+      </p:pic>
+    </p:spTree>
+    <p:extLst>
+      <p:ext uri="{BB962C8B-B14F-4D97-AF65-F5344CB8AC3E}">
+        <p14:creationId xmlns:p14="http://schemas.microsoft.com/office/powerpoint/2010/main" val="4167808467"/>
       </p:ext>
     </p:extLst>
   </p:cSld>

</xml_diff>